<commit_message>
merge 용 local change 커밋 // 깃사용
</commit_message>
<xml_diff>
--- a/기획문서/중간발표/Aww_중간발표.pptx
+++ b/기획문서/중간발표/Aww_중간발표.pptx
@@ -124,7 +124,7 @@
   </p:defaultTextStyle>
   <p:extLst>
     <p:ext uri="{EFAFB233-063F-42B5-8137-9DF3F51BA10A}">
-      <p15:sldGuideLst xmlns:p15="http://schemas.microsoft.com/office/powerpoint/2012/main">
+      <p15:sldGuideLst xmlns:p15="http://schemas.microsoft.com/office/powerpoint/2012/main" xmlns="">
         <p15:guide id="1" orient="horz" pos="2160">
           <p15:clr>
             <a:srgbClr val="A4A3A4"/>
@@ -3116,6 +3116,13 @@
   <p:clrMapOvr>
     <a:masterClrMapping/>
   </p:clrMapOvr>
+  <p:timing>
+    <p:tnLst>
+      <p:par>
+        <p:cTn id="1" dur="indefinite" restart="never" nodeType="tmRoot"/>
+      </p:par>
+    </p:tnLst>
+  </p:timing>
 </p:sld>
 </file>
 
@@ -3153,6 +3160,10 @@
           </a:bodyPr>
           <a:lstStyle/>
           <a:p>
+            <a:r>
+              <a:rPr lang="en-US" altLang="ko-KR" b="1" dirty="0"/>
+              <a:t/>
+            </a:r>
             <a:br>
               <a:rPr lang="en-US" altLang="ko-KR" b="1" dirty="0"/>
             </a:br>
@@ -3179,6 +3190,10 @@
             <a:r>
               <a:rPr lang="ko-KR" altLang="en-US" sz="3100" b="1" dirty="0"/>
               <a:t>최영민</a:t>
+            </a:r>
+            <a:r>
+              <a:rPr lang="en-US" altLang="ko-KR" b="1" dirty="0"/>
+              <a:t/>
             </a:r>
             <a:br>
               <a:rPr lang="en-US" altLang="ko-KR" b="1" dirty="0"/>
@@ -3318,6 +3333,13 @@
   <p:clrMapOvr>
     <a:masterClrMapping/>
   </p:clrMapOvr>
+  <p:timing>
+    <p:tnLst>
+      <p:par>
+        <p:cTn id="1" dur="indefinite" restart="never" nodeType="tmRoot"/>
+      </p:par>
+    </p:tnLst>
+  </p:timing>
 </p:sld>
 </file>
 
@@ -3355,6 +3377,10 @@
           </a:bodyPr>
           <a:lstStyle/>
           <a:p>
+            <a:r>
+              <a:rPr lang="en-US" altLang="ko-KR" b="1" dirty="0"/>
+              <a:t/>
+            </a:r>
             <a:br>
               <a:rPr lang="en-US" altLang="ko-KR" b="1" dirty="0"/>
             </a:br>
@@ -3381,6 +3407,10 @@
             <a:r>
               <a:rPr lang="ko-KR" altLang="en-US" sz="3100" b="1" dirty="0"/>
               <a:t>최영민</a:t>
+            </a:r>
+            <a:r>
+              <a:rPr lang="en-US" altLang="ko-KR" b="1" dirty="0"/>
+              <a:t/>
             </a:r>
             <a:br>
               <a:rPr lang="en-US" altLang="ko-KR" b="1" dirty="0"/>
@@ -3498,6 +3528,13 @@
   <p:clrMapOvr>
     <a:masterClrMapping/>
   </p:clrMapOvr>
+  <p:timing>
+    <p:tnLst>
+      <p:par>
+        <p:cTn id="1" dur="indefinite" restart="never" nodeType="tmRoot"/>
+      </p:par>
+    </p:tnLst>
+  </p:timing>
 </p:sld>
 </file>
 
@@ -3535,6 +3572,10 @@
           </a:bodyPr>
           <a:lstStyle/>
           <a:p>
+            <a:r>
+              <a:rPr lang="en-US" altLang="ko-KR" b="1" dirty="0"/>
+              <a:t/>
+            </a:r>
             <a:br>
               <a:rPr lang="en-US" altLang="ko-KR" b="1" dirty="0"/>
             </a:br>
@@ -3561,6 +3602,10 @@
             <a:r>
               <a:rPr lang="ko-KR" altLang="en-US" sz="3100" b="1" dirty="0"/>
               <a:t>최영민</a:t>
+            </a:r>
+            <a:r>
+              <a:rPr lang="en-US" altLang="ko-KR" b="1" dirty="0"/>
+              <a:t/>
             </a:r>
             <a:br>
               <a:rPr lang="en-US" altLang="ko-KR" b="1" dirty="0"/>
@@ -3618,8 +3663,12 @@
           </a:p>
           <a:p>
             <a:r>
+              <a:rPr lang="ko-KR" altLang="en-US" b="1" dirty="0" smtClean="0"/>
+              <a:t>디테일 작업을 </a:t>
+            </a:r>
+            <a:r>
               <a:rPr lang="ko-KR" altLang="en-US" b="1" dirty="0"/>
-              <a:t>마무리 디테일 작업을 위한 기획서 작성</a:t>
+              <a:t>위한 기획서 작성</a:t>
             </a:r>
             <a:endParaRPr lang="en-US" altLang="ko-KR" b="1" dirty="0"/>
           </a:p>
@@ -3674,8 +3723,12 @@
           </a:p>
           <a:p>
             <a:r>
+              <a:rPr lang="ko-KR" altLang="en-US" b="1" dirty="0" smtClean="0"/>
+              <a:t>조경물 </a:t>
+            </a:r>
+            <a:r>
               <a:rPr lang="ko-KR" altLang="en-US" b="1" dirty="0"/>
-              <a:t>맵 제작을 위한 다양한 오브젝트 제작</a:t>
+              <a:t>제작</a:t>
             </a:r>
           </a:p>
         </p:txBody>
@@ -3690,6 +3743,13 @@
   <p:clrMapOvr>
     <a:masterClrMapping/>
   </p:clrMapOvr>
+  <p:timing>
+    <p:tnLst>
+      <p:par>
+        <p:cTn id="1" dur="indefinite" restart="never" nodeType="tmRoot"/>
+      </p:par>
+    </p:tnLst>
+  </p:timing>
 </p:sld>
 </file>
 
@@ -3727,6 +3787,10 @@
           </a:bodyPr>
           <a:lstStyle/>
           <a:p>
+            <a:r>
+              <a:rPr lang="en-US" altLang="ko-KR" b="1" dirty="0"/>
+              <a:t/>
+            </a:r>
             <a:br>
               <a:rPr lang="en-US" altLang="ko-KR" b="1" dirty="0"/>
             </a:br>
@@ -3749,6 +3813,10 @@
             <a:r>
               <a:rPr lang="en-US" altLang="ko-KR" sz="3100" b="1" dirty="0"/>
               <a:t> </a:t>
+            </a:r>
+            <a:r>
+              <a:rPr lang="en-US" altLang="ko-KR" b="1" dirty="0"/>
+              <a:t/>
             </a:r>
             <a:br>
               <a:rPr lang="en-US" altLang="ko-KR" b="1" dirty="0"/>
@@ -3808,6 +3876,13 @@
   <p:clrMapOvr>
     <a:masterClrMapping/>
   </p:clrMapOvr>
+  <p:timing>
+    <p:tnLst>
+      <p:par>
+        <p:cTn id="1" dur="indefinite" restart="never" nodeType="tmRoot"/>
+      </p:par>
+    </p:tnLst>
+  </p:timing>
 </p:sld>
 </file>
 
@@ -3845,6 +3920,10 @@
           </a:bodyPr>
           <a:lstStyle/>
           <a:p>
+            <a:r>
+              <a:rPr lang="en-US" altLang="ko-KR" b="1" dirty="0"/>
+              <a:t/>
+            </a:r>
             <a:br>
               <a:rPr lang="en-US" altLang="ko-KR" b="1" dirty="0"/>
             </a:br>
@@ -3863,6 +3942,10 @@
             <a:r>
               <a:rPr lang="ko-KR" altLang="en-US" sz="3100" b="1" dirty="0"/>
               <a:t>이진수</a:t>
+            </a:r>
+            <a:r>
+              <a:rPr lang="en-US" altLang="ko-KR" b="1" dirty="0"/>
+              <a:t/>
             </a:r>
             <a:br>
               <a:rPr lang="en-US" altLang="ko-KR" b="1" dirty="0"/>
@@ -3917,7 +4000,15 @@
           <a:p>
             <a:r>
               <a:rPr lang="ko-KR" altLang="en-US" b="1" dirty="0"/>
-              <a:t>구글 로그인 연동을 아직 하지 못했음</a:t>
+              <a:t>구글 로그인 연동을 </a:t>
+            </a:r>
+            <a:r>
+              <a:rPr lang="ko-KR" altLang="en-US" b="1" dirty="0" smtClean="0"/>
+              <a:t>미구</a:t>
+            </a:r>
+            <a:r>
+              <a:rPr lang="ko-KR" altLang="en-US" b="1" dirty="0"/>
+              <a:t>현</a:t>
             </a:r>
             <a:endParaRPr lang="en-US" altLang="ko-KR" b="1" dirty="0"/>
           </a:p>
@@ -3957,6 +4048,13 @@
   <p:clrMapOvr>
     <a:masterClrMapping/>
   </p:clrMapOvr>
+  <p:timing>
+    <p:tnLst>
+      <p:par>
+        <p:cTn id="1" dur="indefinite" restart="never" nodeType="tmRoot"/>
+      </p:par>
+    </p:tnLst>
+  </p:timing>
 </p:sld>
 </file>
 
@@ -3994,6 +4092,10 @@
           </a:bodyPr>
           <a:lstStyle/>
           <a:p>
+            <a:r>
+              <a:rPr lang="en-US" altLang="ko-KR" b="1" dirty="0"/>
+              <a:t/>
+            </a:r>
             <a:br>
               <a:rPr lang="en-US" altLang="ko-KR" b="1" dirty="0"/>
             </a:br>
@@ -4012,6 +4114,10 @@
             <a:r>
               <a:rPr lang="ko-KR" altLang="en-US" sz="3100" b="1" dirty="0"/>
               <a:t>이진수</a:t>
+            </a:r>
+            <a:r>
+              <a:rPr lang="en-US" altLang="ko-KR" b="1" dirty="0"/>
+              <a:t/>
             </a:r>
             <a:br>
               <a:rPr lang="en-US" altLang="ko-KR" b="1" dirty="0"/>
@@ -4105,6 +4211,13 @@
   <p:clrMapOvr>
     <a:masterClrMapping/>
   </p:clrMapOvr>
+  <p:timing>
+    <p:tnLst>
+      <p:par>
+        <p:cTn id="1" dur="indefinite" restart="never" nodeType="tmRoot"/>
+      </p:par>
+    </p:tnLst>
+  </p:timing>
 </p:sld>
 </file>
 
@@ -4142,6 +4255,10 @@
           </a:bodyPr>
           <a:lstStyle/>
           <a:p>
+            <a:r>
+              <a:rPr lang="en-US" altLang="ko-KR" b="1" dirty="0"/>
+              <a:t/>
+            </a:r>
             <a:br>
               <a:rPr lang="en-US" altLang="ko-KR" b="1" dirty="0"/>
             </a:br>
@@ -4152,6 +4269,10 @@
             <a:r>
               <a:rPr lang="ko-KR" altLang="en-US" b="1" dirty="0"/>
               <a:t>개발 환경</a:t>
+            </a:r>
+            <a:r>
+              <a:rPr lang="en-US" altLang="ko-KR" b="1" dirty="0"/>
+              <a:t/>
             </a:r>
             <a:br>
               <a:rPr lang="en-US" altLang="ko-KR" b="1" dirty="0"/>
@@ -4701,6 +4822,13 @@
   <p:clrMapOvr>
     <a:masterClrMapping/>
   </p:clrMapOvr>
+  <p:timing>
+    <p:tnLst>
+      <p:par>
+        <p:cTn id="1" dur="indefinite" restart="never" nodeType="tmRoot"/>
+      </p:par>
+    </p:tnLst>
+  </p:timing>
 </p:sld>
 </file>
 
@@ -4738,6 +4866,10 @@
           </a:bodyPr>
           <a:lstStyle/>
           <a:p>
+            <a:r>
+              <a:rPr lang="en-US" altLang="ko-KR" b="1" dirty="0"/>
+              <a:t/>
+            </a:r>
             <a:br>
               <a:rPr lang="en-US" altLang="ko-KR" b="1" dirty="0"/>
             </a:br>
@@ -4748,6 +4880,10 @@
             <a:r>
               <a:rPr lang="ko-KR" altLang="en-US" b="1" dirty="0"/>
               <a:t>개발 일정</a:t>
+            </a:r>
+            <a:r>
+              <a:rPr lang="en-US" altLang="ko-KR" b="1" dirty="0"/>
+              <a:t/>
             </a:r>
             <a:br>
               <a:rPr lang="en-US" altLang="ko-KR" b="1" dirty="0"/>
@@ -4794,6 +4930,13 @@
   <p:clrMapOvr>
     <a:masterClrMapping/>
   </p:clrMapOvr>
+  <p:timing>
+    <p:tnLst>
+      <p:par>
+        <p:cTn id="1" dur="indefinite" restart="never" nodeType="tmRoot"/>
+      </p:par>
+    </p:tnLst>
+  </p:timing>
 </p:sld>
 </file>
 
@@ -4831,6 +4974,10 @@
           </a:bodyPr>
           <a:lstStyle/>
           <a:p>
+            <a:r>
+              <a:rPr lang="en-US" altLang="ko-KR" dirty="0"/>
+              <a:t/>
+            </a:r>
             <a:br>
               <a:rPr lang="en-US" altLang="ko-KR" dirty="0"/>
             </a:br>
@@ -4894,6 +5041,13 @@
   <p:clrMapOvr>
     <a:masterClrMapping/>
   </p:clrMapOvr>
+  <p:timing>
+    <p:tnLst>
+      <p:par>
+        <p:cTn id="1" dur="indefinite" restart="never" nodeType="tmRoot"/>
+      </p:par>
+    </p:tnLst>
+  </p:timing>
 </p:sld>
 </file>
 
@@ -4968,6 +5122,13 @@
   <p:clrMapOvr>
     <a:masterClrMapping/>
   </p:clrMapOvr>
+  <p:timing>
+    <p:tnLst>
+      <p:par>
+        <p:cTn id="1" dur="indefinite" restart="never" nodeType="tmRoot"/>
+      </p:par>
+    </p:tnLst>
+  </p:timing>
 </p:sld>
 </file>
 
@@ -5152,6 +5313,13 @@
   <p:clrMapOvr>
     <a:masterClrMapping/>
   </p:clrMapOvr>
+  <p:timing>
+    <p:tnLst>
+      <p:par>
+        <p:cTn id="1" dur="indefinite" restart="never" nodeType="tmRoot"/>
+      </p:par>
+    </p:tnLst>
+  </p:timing>
 </p:sld>
 </file>
 
@@ -5473,6 +5641,10 @@
               <a:rPr lang="ko-KR" altLang="en-US" sz="2000" dirty="0"/>
               <a:t>전투 피드백에 따른 전략 </a:t>
             </a:r>
+            <a:r>
+              <a:rPr lang="en-US" altLang="ko-KR" sz="2000" dirty="0"/>
+              <a:t/>
+            </a:r>
             <a:br>
               <a:rPr lang="en-US" altLang="ko-KR" sz="2000" dirty="0"/>
             </a:br>
@@ -5598,6 +5770,13 @@
   <p:clrMapOvr>
     <a:masterClrMapping/>
   </p:clrMapOvr>
+  <p:timing>
+    <p:tnLst>
+      <p:par>
+        <p:cTn id="1" dur="indefinite" restart="never" nodeType="tmRoot"/>
+      </p:par>
+    </p:tnLst>
+  </p:timing>
 </p:sld>
 </file>
 
@@ -6110,6 +6289,13 @@
   <p:clrMapOvr>
     <a:masterClrMapping/>
   </p:clrMapOvr>
+  <p:timing>
+    <p:tnLst>
+      <p:par>
+        <p:cTn id="1" dur="indefinite" restart="never" nodeType="tmRoot"/>
+      </p:par>
+    </p:tnLst>
+  </p:timing>
 </p:sld>
 </file>
 
@@ -6849,6 +7035,13 @@
   <p:clrMapOvr>
     <a:masterClrMapping/>
   </p:clrMapOvr>
+  <p:timing>
+    <p:tnLst>
+      <p:par>
+        <p:cTn id="1" dur="indefinite" restart="never" nodeType="tmRoot"/>
+      </p:par>
+    </p:tnLst>
+  </p:timing>
 </p:sld>
 </file>
 
@@ -7253,6 +7446,10 @@
               <a:rPr lang="ko-KR" altLang="en-US" dirty="0"/>
               <a:t>화면 드래그</a:t>
             </a:r>
+            <a:r>
+              <a:rPr lang="en-US" altLang="ko-KR" dirty="0"/>
+              <a:t/>
+            </a:r>
             <a:br>
               <a:rPr lang="en-US" altLang="ko-KR" dirty="0"/>
             </a:br>
@@ -7277,6 +7474,13 @@
   <p:clrMapOvr>
     <a:masterClrMapping/>
   </p:clrMapOvr>
+  <p:timing>
+    <p:tnLst>
+      <p:par>
+        <p:cTn id="1" dur="indefinite" restart="never" nodeType="tmRoot"/>
+      </p:par>
+    </p:tnLst>
+  </p:timing>
 </p:sld>
 </file>
 
@@ -7314,6 +7518,10 @@
           </a:bodyPr>
           <a:lstStyle/>
           <a:p>
+            <a:r>
+              <a:rPr lang="en-US" altLang="ko-KR" b="1" dirty="0"/>
+              <a:t/>
+            </a:r>
             <a:br>
               <a:rPr lang="en-US" altLang="ko-KR" b="1" dirty="0"/>
             </a:br>
@@ -7336,6 +7544,10 @@
             <a:r>
               <a:rPr lang="en-US" altLang="ko-KR" sz="3100" b="1" dirty="0"/>
               <a:t> </a:t>
+            </a:r>
+            <a:r>
+              <a:rPr lang="en-US" altLang="ko-KR" b="1" dirty="0"/>
+              <a:t/>
             </a:r>
             <a:br>
               <a:rPr lang="en-US" altLang="ko-KR" b="1" dirty="0"/>
@@ -7383,6 +7595,13 @@
   <p:clrMapOvr>
     <a:masterClrMapping/>
   </p:clrMapOvr>
+  <p:timing>
+    <p:tnLst>
+      <p:par>
+        <p:cTn id="1" dur="indefinite" restart="never" nodeType="tmRoot"/>
+      </p:par>
+    </p:tnLst>
+  </p:timing>
 </p:sld>
 </file>
 
@@ -7420,6 +7639,10 @@
           </a:bodyPr>
           <a:lstStyle/>
           <a:p>
+            <a:r>
+              <a:rPr lang="en-US" altLang="ko-KR" b="1" dirty="0"/>
+              <a:t/>
+            </a:r>
             <a:br>
               <a:rPr lang="en-US" altLang="ko-KR" b="1" dirty="0"/>
             </a:br>
@@ -7438,6 +7661,10 @@
             <a:r>
               <a:rPr lang="ko-KR" altLang="en-US" sz="3100" b="1" dirty="0"/>
               <a:t>조지훈</a:t>
+            </a:r>
+            <a:r>
+              <a:rPr lang="en-US" altLang="ko-KR" b="1" dirty="0"/>
+              <a:t/>
             </a:r>
             <a:br>
               <a:rPr lang="en-US" altLang="ko-KR" b="1" dirty="0"/>
@@ -7485,6 +7712,13 @@
   <p:clrMapOvr>
     <a:masterClrMapping/>
   </p:clrMapOvr>
+  <p:timing>
+    <p:tnLst>
+      <p:par>
+        <p:cTn id="1" dur="indefinite" restart="never" nodeType="tmRoot"/>
+      </p:par>
+    </p:tnLst>
+  </p:timing>
 </p:sld>
 </file>
 
@@ -7522,6 +7756,10 @@
           </a:bodyPr>
           <a:lstStyle/>
           <a:p>
+            <a:r>
+              <a:rPr lang="en-US" altLang="ko-KR" b="1" dirty="0"/>
+              <a:t/>
+            </a:r>
             <a:br>
               <a:rPr lang="en-US" altLang="ko-KR" b="1" dirty="0"/>
             </a:br>
@@ -7540,6 +7778,10 @@
             <a:r>
               <a:rPr lang="ko-KR" altLang="en-US" sz="3100" b="1" dirty="0"/>
               <a:t>조지훈</a:t>
+            </a:r>
+            <a:r>
+              <a:rPr lang="en-US" altLang="ko-KR" b="1" dirty="0"/>
+              <a:t/>
             </a:r>
             <a:br>
               <a:rPr lang="en-US" altLang="ko-KR" b="1" dirty="0"/>
@@ -7587,6 +7829,13 @@
   <p:clrMapOvr>
     <a:masterClrMapping/>
   </p:clrMapOvr>
+  <p:timing>
+    <p:tnLst>
+      <p:par>
+        <p:cTn id="1" dur="indefinite" restart="never" nodeType="tmRoot"/>
+      </p:par>
+    </p:tnLst>
+  </p:timing>
 </p:sld>
 </file>
 
@@ -7879,7 +8128,7 @@
   <a:extraClrSchemeLst/>
   <a:extLst>
     <a:ext uri="{05A4C25C-085E-4340-85A3-A5531E510DB2}">
-      <thm15:themeFamily xmlns:thm15="http://schemas.microsoft.com/office/thememl/2012/main" name="Office Theme" id="{62F939B6-93AF-4DB8-9C6B-D6C7DFDC589F}" vid="{4A3C46E8-61CC-4603-A589-7422A47A8E4A}"/>
+      <thm15:themeFamily xmlns:thm15="http://schemas.microsoft.com/office/thememl/2012/main" xmlns="" name="Office Theme" id="{62F939B6-93AF-4DB8-9C6B-D6C7DFDC589F}" vid="{4A3C46E8-61CC-4603-A589-7422A47A8E4A}"/>
     </a:ext>
   </a:extLst>
 </a:theme>

</xml_diff>

<commit_message>
전투 ui 제작 // ui
</commit_message>
<xml_diff>
--- a/기획문서/중간발표/Aww_중간발표.pptx
+++ b/기획문서/중간발표/Aww_중간발표.pptx
@@ -5,10 +5,10 @@
     <p:sldMasterId id="2147483648" r:id="rId1"/>
   </p:sldMasterIdLst>
   <p:notesMasterIdLst>
-    <p:notesMasterId r:id="rId23"/>
+    <p:notesMasterId r:id="rId16"/>
   </p:notesMasterIdLst>
   <p:handoutMasterIdLst>
-    <p:handoutMasterId r:id="rId24"/>
+    <p:handoutMasterId r:id="rId17"/>
   </p:handoutMasterIdLst>
   <p:sldIdLst>
     <p:sldId id="256" r:id="rId2"/>
@@ -25,13 +25,6 @@
     <p:sldId id="279" r:id="rId13"/>
     <p:sldId id="265" r:id="rId14"/>
     <p:sldId id="280" r:id="rId15"/>
-    <p:sldId id="273" r:id="rId16"/>
-    <p:sldId id="274" r:id="rId17"/>
-    <p:sldId id="275" r:id="rId18"/>
-    <p:sldId id="276" r:id="rId19"/>
-    <p:sldId id="277" r:id="rId20"/>
-    <p:sldId id="278" r:id="rId21"/>
-    <p:sldId id="281" r:id="rId22"/>
   </p:sldIdLst>
   <p:sldSz cx="12192000" cy="6858000"/>
   <p:notesSz cx="6858000" cy="9144000"/>
@@ -132,7 +125,7 @@
   </p:defaultTextStyle>
   <p:extLst>
     <p:ext uri="{EFAFB233-063F-42B5-8137-9DF3F51BA10A}">
-      <p15:sldGuideLst xmlns="" xmlns:p15="http://schemas.microsoft.com/office/powerpoint/2012/main">
+      <p15:sldGuideLst xmlns:p15="http://schemas.microsoft.com/office/powerpoint/2012/main" xmlns="">
         <p15:guide id="1" orient="horz" pos="2160">
           <p15:clr>
             <a:srgbClr val="A4A3A4"/>
@@ -231,7 +224,7 @@
           <a:p>
             <a:fld id="{C01DA57C-525A-483D-BB95-B3AA2178D15B}" type="datetimeFigureOut">
               <a:rPr lang="ko-KR" altLang="en-US" smtClean="0"/>
-              <a:t>2016-05-10</a:t>
+              <a:t>2016-05-11</a:t>
             </a:fld>
             <a:endParaRPr lang="ko-KR" altLang="en-US"/>
           </a:p>
@@ -397,7 +390,7 @@
           <a:p>
             <a:fld id="{6C359908-2688-4626-9703-D941A7507AB5}" type="datetimeFigureOut">
               <a:rPr lang="ko-KR" altLang="en-US" smtClean="0"/>
-              <a:t>2016-05-10</a:t>
+              <a:t>2016-05-11</a:t>
             </a:fld>
             <a:endParaRPr lang="ko-KR" altLang="en-US"/>
           </a:p>
@@ -879,7 +872,7 @@
           <a:p>
             <a:fld id="{CA8DE845-1C5F-416F-8617-C1B7363F8B26}" type="datetime1">
               <a:rPr lang="ko-KR" altLang="en-US" smtClean="0"/>
-              <a:t>2016-05-10</a:t>
+              <a:t>2016-05-11</a:t>
             </a:fld>
             <a:endParaRPr lang="ko-KR" altLang="en-US"/>
           </a:p>
@@ -1047,7 +1040,7 @@
           <a:p>
             <a:fld id="{14E1F7A5-A2D4-4285-8C4D-AE53052C11C4}" type="datetime1">
               <a:rPr lang="ko-KR" altLang="en-US" smtClean="0"/>
-              <a:t>2016-05-10</a:t>
+              <a:t>2016-05-11</a:t>
             </a:fld>
             <a:endParaRPr lang="ko-KR" altLang="en-US"/>
           </a:p>
@@ -1225,7 +1218,7 @@
           <a:p>
             <a:fld id="{9A883F9D-8B82-4233-9BC2-42F15A67E5D6}" type="datetime1">
               <a:rPr lang="ko-KR" altLang="en-US" smtClean="0"/>
-              <a:t>2016-05-10</a:t>
+              <a:t>2016-05-11</a:t>
             </a:fld>
             <a:endParaRPr lang="ko-KR" altLang="en-US"/>
           </a:p>
@@ -1393,7 +1386,7 @@
           <a:p>
             <a:fld id="{C35F1DFC-B93C-4C57-9324-B134FB45B096}" type="datetime1">
               <a:rPr lang="ko-KR" altLang="en-US" smtClean="0"/>
-              <a:t>2016-05-10</a:t>
+              <a:t>2016-05-11</a:t>
             </a:fld>
             <a:endParaRPr lang="ko-KR" altLang="en-US"/>
           </a:p>
@@ -1638,7 +1631,7 @@
           <a:p>
             <a:fld id="{71097BF1-679B-4D2F-BFD1-99FEF4C1D1C4}" type="datetime1">
               <a:rPr lang="ko-KR" altLang="en-US" smtClean="0"/>
-              <a:t>2016-05-10</a:t>
+              <a:t>2016-05-11</a:t>
             </a:fld>
             <a:endParaRPr lang="ko-KR" altLang="en-US"/>
           </a:p>
@@ -1867,7 +1860,7 @@
           <a:p>
             <a:fld id="{72E2C973-E4AD-4205-9865-908439E67FC9}" type="datetime1">
               <a:rPr lang="ko-KR" altLang="en-US" smtClean="0"/>
-              <a:t>2016-05-10</a:t>
+              <a:t>2016-05-11</a:t>
             </a:fld>
             <a:endParaRPr lang="ko-KR" altLang="en-US"/>
           </a:p>
@@ -2231,7 +2224,7 @@
           <a:p>
             <a:fld id="{F1630B2A-53DD-4733-A408-785D91974C35}" type="datetime1">
               <a:rPr lang="ko-KR" altLang="en-US" smtClean="0"/>
-              <a:t>2016-05-10</a:t>
+              <a:t>2016-05-11</a:t>
             </a:fld>
             <a:endParaRPr lang="ko-KR" altLang="en-US"/>
           </a:p>
@@ -2348,7 +2341,7 @@
           <a:p>
             <a:fld id="{8846F695-B098-42F1-BACD-30E47BB2D026}" type="datetime1">
               <a:rPr lang="ko-KR" altLang="en-US" smtClean="0"/>
-              <a:t>2016-05-10</a:t>
+              <a:t>2016-05-11</a:t>
             </a:fld>
             <a:endParaRPr lang="ko-KR" altLang="en-US"/>
           </a:p>
@@ -2443,7 +2436,7 @@
           <a:p>
             <a:fld id="{F9CFE27F-5504-4361-9D82-76FE96C876B0}" type="datetime1">
               <a:rPr lang="ko-KR" altLang="en-US" smtClean="0"/>
-              <a:t>2016-05-10</a:t>
+              <a:t>2016-05-11</a:t>
             </a:fld>
             <a:endParaRPr lang="ko-KR" altLang="en-US"/>
           </a:p>
@@ -2718,7 +2711,7 @@
           <a:p>
             <a:fld id="{3CB31587-26D7-45EA-BAD0-DC6A80ED7590}" type="datetime1">
               <a:rPr lang="ko-KR" altLang="en-US" smtClean="0"/>
-              <a:t>2016-05-10</a:t>
+              <a:t>2016-05-11</a:t>
             </a:fld>
             <a:endParaRPr lang="ko-KR" altLang="en-US"/>
           </a:p>
@@ -2970,7 +2963,7 @@
           <a:p>
             <a:fld id="{EA06E6AC-7C5B-4CDC-926B-2F658D6B625C}" type="datetime1">
               <a:rPr lang="ko-KR" altLang="en-US" smtClean="0"/>
-              <a:t>2016-05-10</a:t>
+              <a:t>2016-05-11</a:t>
             </a:fld>
             <a:endParaRPr lang="ko-KR" altLang="en-US"/>
           </a:p>
@@ -3191,7 +3184,7 @@
           <a:p>
             <a:fld id="{84CA5D6B-1B3B-401D-8CC9-327BB51EC254}" type="datetime1">
               <a:rPr lang="ko-KR" altLang="en-US" smtClean="0"/>
-              <a:t>2016-05-10</a:t>
+              <a:t>2016-05-11</a:t>
             </a:fld>
             <a:endParaRPr lang="ko-KR" altLang="en-US"/>
           </a:p>
@@ -3786,7 +3779,7 @@
         <p:spPr>
           <a:xfrm>
             <a:off x="1216479" y="5314949"/>
-            <a:ext cx="2090057" cy="767444"/>
+            <a:ext cx="2090057" cy="938894"/>
           </a:xfrm>
           <a:prstGeom prst="rect">
             <a:avLst/>
@@ -4049,11 +4042,7 @@
               </a:r>
               <a:r>
                 <a:rPr lang="ko-KR" altLang="en-US" b="1" dirty="0" smtClean="0"/>
-                <a:t> </a:t>
-              </a:r>
-              <a:r>
-                <a:rPr lang="ko-KR" altLang="en-US" b="1" dirty="0" smtClean="0"/>
-                <a:t>재설계</a:t>
+                <a:t> 재설계</a:t>
               </a:r>
               <a:endParaRPr lang="en-US" altLang="ko-KR" b="1" dirty="0"/>
             </a:p>
@@ -5618,6 +5607,36 @@
           </a:p>
         </p:txBody>
       </p:sp>
+      <p:pic>
+        <p:nvPicPr>
+          <p:cNvPr id="7" name="Picture 6"/>
+          <p:cNvPicPr>
+            <a:picLocks noChangeAspect="1"/>
+          </p:cNvPicPr>
+          <p:nvPr/>
+        </p:nvPicPr>
+        <p:blipFill>
+          <a:blip r:embed="rId2">
+            <a:extLst>
+              <a:ext uri="{28A0092B-C50C-407E-A947-70E740481C1C}">
+                <a14:useLocalDpi xmlns:a14="http://schemas.microsoft.com/office/drawing/2010/main" val="0"/>
+              </a:ext>
+            </a:extLst>
+          </a:blip>
+          <a:stretch>
+            <a:fillRect/>
+          </a:stretch>
+        </p:blipFill>
+        <p:spPr>
+          <a:xfrm>
+            <a:off x="1022637" y="1510393"/>
+            <a:ext cx="10146726" cy="4743450"/>
+          </a:xfrm>
+          <a:prstGeom prst="rect">
+            <a:avLst/>
+          </a:prstGeom>
+        </p:spPr>
+      </p:pic>
     </p:spTree>
     <p:extLst>
       <p:ext uri="{BB962C8B-B14F-4D97-AF65-F5344CB8AC3E}">
@@ -5845,1102 +5864,6 @@
 </p:sld>
 </file>
 
-<file path=ppt/slides/slide15.xml><?xml version="1.0" encoding="utf-8"?>
-<p:sld xmlns:a="http://schemas.openxmlformats.org/drawingml/2006/main" xmlns:r="http://schemas.openxmlformats.org/officeDocument/2006/relationships" xmlns:p="http://schemas.openxmlformats.org/presentationml/2006/main">
-  <p:cSld>
-    <p:spTree>
-      <p:nvGrpSpPr>
-        <p:cNvPr id="1" name=""/>
-        <p:cNvGrpSpPr/>
-        <p:nvPr/>
-      </p:nvGrpSpPr>
-      <p:grpSpPr>
-        <a:xfrm>
-          <a:off x="0" y="0"/>
-          <a:ext cx="0" cy="0"/>
-          <a:chOff x="0" y="0"/>
-          <a:chExt cx="0" cy="0"/>
-        </a:xfrm>
-      </p:grpSpPr>
-      <p:sp>
-        <p:nvSpPr>
-          <p:cNvPr id="2" name="제목 1"/>
-          <p:cNvSpPr>
-            <a:spLocks noGrp="1"/>
-          </p:cNvSpPr>
-          <p:nvPr>
-            <p:ph type="title"/>
-          </p:nvPr>
-        </p:nvSpPr>
-        <p:spPr/>
-        <p:txBody>
-          <a:bodyPr>
-            <a:normAutofit fontScale="90000"/>
-          </a:bodyPr>
-          <a:lstStyle/>
-          <a:p>
-            <a:r>
-              <a:rPr lang="en-US" altLang="ko-KR" b="1" dirty="0"/>
-              <a:t/>
-            </a:r>
-            <a:br>
-              <a:rPr lang="en-US" altLang="ko-KR" b="1" dirty="0"/>
-            </a:br>
-            <a:r>
-              <a:rPr lang="en-US" altLang="ko-KR" b="1" dirty="0"/>
-              <a:t>4-2. </a:t>
-            </a:r>
-            <a:r>
-              <a:rPr lang="ko-KR" altLang="en-US" b="1" dirty="0"/>
-              <a:t>기획</a:t>
-            </a:r>
-            <a:r>
-              <a:rPr lang="en-US" altLang="ko-KR" b="1" dirty="0"/>
-              <a:t>,</a:t>
-            </a:r>
-            <a:r>
-              <a:rPr lang="ko-KR" altLang="en-US" b="1" dirty="0"/>
-              <a:t>그래픽 개발 상황 </a:t>
-            </a:r>
-            <a:r>
-              <a:rPr lang="en-US" altLang="ko-KR" b="1" dirty="0"/>
-              <a:t>– </a:t>
-            </a:r>
-            <a:r>
-              <a:rPr lang="ko-KR" altLang="en-US" sz="3100" b="1" dirty="0"/>
-              <a:t>최영민</a:t>
-            </a:r>
-            <a:r>
-              <a:rPr lang="en-US" altLang="ko-KR" b="1" dirty="0"/>
-              <a:t/>
-            </a:r>
-            <a:br>
-              <a:rPr lang="en-US" altLang="ko-KR" b="1" dirty="0"/>
-            </a:br>
-            <a:endParaRPr lang="ko-KR" altLang="en-US" dirty="0"/>
-          </a:p>
-        </p:txBody>
-      </p:sp>
-      <p:sp>
-        <p:nvSpPr>
-          <p:cNvPr id="3" name="내용 개체 틀 2"/>
-          <p:cNvSpPr>
-            <a:spLocks noGrp="1"/>
-          </p:cNvSpPr>
-          <p:nvPr>
-            <p:ph idx="1"/>
-          </p:nvPr>
-        </p:nvSpPr>
-        <p:spPr>
-          <a:xfrm>
-            <a:off x="838200" y="1825624"/>
-            <a:ext cx="10366829" cy="4865462"/>
-          </a:xfrm>
-        </p:spPr>
-        <p:txBody>
-          <a:bodyPr>
-            <a:normAutofit lnSpcReduction="10000"/>
-          </a:bodyPr>
-          <a:lstStyle/>
-          <a:p>
-            <a:r>
-              <a:rPr lang="ko-KR" altLang="en-US" b="1" dirty="0"/>
-              <a:t>메인 시스템 기획</a:t>
-            </a:r>
-            <a:endParaRPr lang="en-US" altLang="ko-KR" b="1" dirty="0"/>
-          </a:p>
-          <a:p>
-            <a:r>
-              <a:rPr lang="ko-KR" altLang="en-US" b="1" dirty="0"/>
-              <a:t>스토리라인 </a:t>
-            </a:r>
-            <a:r>
-              <a:rPr lang="ko-KR" altLang="en-US" b="1" dirty="0" smtClean="0"/>
-              <a:t>기획</a:t>
-            </a:r>
-            <a:endParaRPr lang="en-US" altLang="ko-KR" b="1" dirty="0" smtClean="0"/>
-          </a:p>
-          <a:p>
-            <a:r>
-              <a:rPr lang="ko-KR" altLang="en-US" b="1" dirty="0" smtClean="0"/>
-              <a:t>캐릭터</a:t>
-            </a:r>
-            <a:r>
-              <a:rPr lang="en-US" altLang="ko-KR" b="1" dirty="0" smtClean="0"/>
-              <a:t>/</a:t>
-            </a:r>
-            <a:r>
-              <a:rPr lang="ko-KR" altLang="en-US" b="1" dirty="0" smtClean="0"/>
-              <a:t>스킬 기획</a:t>
-            </a:r>
-            <a:endParaRPr lang="en-US" altLang="ko-KR" b="1" dirty="0"/>
-          </a:p>
-          <a:p>
-            <a:r>
-              <a:rPr lang="ko-KR" altLang="en-US" b="1" dirty="0"/>
-              <a:t>챕터</a:t>
-            </a:r>
-            <a:r>
-              <a:rPr lang="en-US" altLang="ko-KR" b="1" dirty="0"/>
-              <a:t>/</a:t>
-            </a:r>
-            <a:r>
-              <a:rPr lang="ko-KR" altLang="en-US" b="1" dirty="0"/>
-              <a:t>스테이지 </a:t>
-            </a:r>
-            <a:r>
-              <a:rPr lang="ko-KR" altLang="en-US" b="1" dirty="0" smtClean="0"/>
-              <a:t>기획</a:t>
-            </a:r>
-            <a:endParaRPr lang="en-US" altLang="ko-KR" b="1" dirty="0"/>
-          </a:p>
-          <a:p>
-            <a:r>
-              <a:rPr lang="en-US" altLang="ko-KR" b="1" dirty="0"/>
-              <a:t>UX/UI </a:t>
-            </a:r>
-            <a:r>
-              <a:rPr lang="ko-KR" altLang="en-US" b="1" dirty="0" smtClean="0"/>
-              <a:t>기획후 피드백을 받아 개선중</a:t>
-            </a:r>
-            <a:endParaRPr lang="en-US" altLang="ko-KR" b="1" dirty="0" smtClean="0"/>
-          </a:p>
-          <a:p>
-            <a:pPr marL="0" indent="0">
-              <a:buNone/>
-            </a:pPr>
-            <a:r>
-              <a:rPr lang="en-US" altLang="ko-KR" b="1" dirty="0" smtClean="0"/>
-              <a:t>------------------------------------------------------</a:t>
-            </a:r>
-          </a:p>
-          <a:p>
-            <a:r>
-              <a:rPr lang="ko-KR" altLang="en-US" b="1" dirty="0" smtClean="0"/>
-              <a:t>캐릭터 </a:t>
-            </a:r>
-            <a:r>
-              <a:rPr lang="ko-KR" altLang="en-US" b="1" dirty="0"/>
-              <a:t>모델링완료</a:t>
-            </a:r>
-            <a:endParaRPr lang="en-US" altLang="ko-KR" b="1" dirty="0"/>
-          </a:p>
-          <a:p>
-            <a:r>
-              <a:rPr lang="ko-KR" altLang="en-US" b="1" dirty="0"/>
-              <a:t>타일 모델링완료</a:t>
-            </a:r>
-            <a:endParaRPr lang="en-US" altLang="ko-KR" b="1" dirty="0"/>
-          </a:p>
-          <a:p>
-            <a:r>
-              <a:rPr lang="ko-KR" altLang="en-US" b="1" dirty="0"/>
-              <a:t>조경오브젝트 </a:t>
-            </a:r>
-            <a:r>
-              <a:rPr lang="en-US" altLang="ko-KR" b="1" dirty="0"/>
-              <a:t>80%</a:t>
-            </a:r>
-            <a:r>
-              <a:rPr lang="ko-KR" altLang="en-US" b="1" dirty="0"/>
-              <a:t>이상 제작</a:t>
-            </a:r>
-            <a:endParaRPr lang="en-US" altLang="ko-KR" b="1" dirty="0"/>
-          </a:p>
-          <a:p>
-            <a:r>
-              <a:rPr lang="en-US" altLang="ko-KR" b="1" dirty="0"/>
-              <a:t>UI </a:t>
-            </a:r>
-            <a:r>
-              <a:rPr lang="ko-KR" altLang="en-US" b="1" dirty="0"/>
-              <a:t>제작중</a:t>
-            </a:r>
-            <a:endParaRPr lang="en-US" altLang="ko-KR" b="1" dirty="0"/>
-          </a:p>
-          <a:p>
-            <a:endParaRPr lang="en-US" altLang="ko-KR" dirty="0"/>
-          </a:p>
-          <a:p>
-            <a:pPr marL="0" indent="0">
-              <a:buNone/>
-            </a:pPr>
-            <a:endParaRPr lang="ko-KR" altLang="en-US" dirty="0"/>
-          </a:p>
-        </p:txBody>
-      </p:sp>
-      <p:sp>
-        <p:nvSpPr>
-          <p:cNvPr id="5" name="Slide Number Placeholder 4"/>
-          <p:cNvSpPr>
-            <a:spLocks noGrp="1"/>
-          </p:cNvSpPr>
-          <p:nvPr>
-            <p:ph type="sldNum" sz="quarter" idx="12"/>
-          </p:nvPr>
-        </p:nvSpPr>
-        <p:spPr/>
-        <p:txBody>
-          <a:bodyPr/>
-          <a:lstStyle/>
-          <a:p>
-            <a:fld id="{FBFC020C-1606-4BED-91BA-A6230104B3B1}" type="slidenum">
-              <a:rPr lang="ko-KR" altLang="en-US" smtClean="0"/>
-              <a:t>15</a:t>
-            </a:fld>
-            <a:endParaRPr lang="ko-KR" altLang="en-US"/>
-          </a:p>
-        </p:txBody>
-      </p:sp>
-    </p:spTree>
-    <p:extLst>
-      <p:ext uri="{BB962C8B-B14F-4D97-AF65-F5344CB8AC3E}">
-        <p14:creationId xmlns:p14="http://schemas.microsoft.com/office/powerpoint/2010/main" val="3773845397"/>
-      </p:ext>
-    </p:extLst>
-  </p:cSld>
-  <p:clrMapOvr>
-    <a:masterClrMapping/>
-  </p:clrMapOvr>
-  <p:timing>
-    <p:tnLst>
-      <p:par>
-        <p:cTn id="1" dur="indefinite" restart="never" nodeType="tmRoot"/>
-      </p:par>
-    </p:tnLst>
-  </p:timing>
-</p:sld>
-</file>
-
-<file path=ppt/slides/slide16.xml><?xml version="1.0" encoding="utf-8"?>
-<p:sld xmlns:a="http://schemas.openxmlformats.org/drawingml/2006/main" xmlns:r="http://schemas.openxmlformats.org/officeDocument/2006/relationships" xmlns:p="http://schemas.openxmlformats.org/presentationml/2006/main">
-  <p:cSld>
-    <p:spTree>
-      <p:nvGrpSpPr>
-        <p:cNvPr id="1" name=""/>
-        <p:cNvGrpSpPr/>
-        <p:nvPr/>
-      </p:nvGrpSpPr>
-      <p:grpSpPr>
-        <a:xfrm>
-          <a:off x="0" y="0"/>
-          <a:ext cx="0" cy="0"/>
-          <a:chOff x="0" y="0"/>
-          <a:chExt cx="0" cy="0"/>
-        </a:xfrm>
-      </p:grpSpPr>
-      <p:sp>
-        <p:nvSpPr>
-          <p:cNvPr id="2" name="제목 1"/>
-          <p:cNvSpPr>
-            <a:spLocks noGrp="1"/>
-          </p:cNvSpPr>
-          <p:nvPr>
-            <p:ph type="title"/>
-          </p:nvPr>
-        </p:nvSpPr>
-        <p:spPr/>
-        <p:txBody>
-          <a:bodyPr>
-            <a:normAutofit fontScale="90000"/>
-          </a:bodyPr>
-          <a:lstStyle/>
-          <a:p>
-            <a:r>
-              <a:rPr lang="en-US" altLang="ko-KR" b="1" dirty="0"/>
-              <a:t/>
-            </a:r>
-            <a:br>
-              <a:rPr lang="en-US" altLang="ko-KR" b="1" dirty="0"/>
-            </a:br>
-            <a:r>
-              <a:rPr lang="en-US" altLang="ko-KR" b="1" dirty="0"/>
-              <a:t>4-2.</a:t>
-            </a:r>
-            <a:r>
-              <a:rPr lang="ko-KR" altLang="en-US" b="1" dirty="0"/>
-              <a:t> 기획</a:t>
-            </a:r>
-            <a:r>
-              <a:rPr lang="en-US" altLang="ko-KR" b="1" dirty="0"/>
-              <a:t>,</a:t>
-            </a:r>
-            <a:r>
-              <a:rPr lang="ko-KR" altLang="en-US" b="1" dirty="0"/>
-              <a:t>그래픽 개발 미흡점 </a:t>
-            </a:r>
-            <a:r>
-              <a:rPr lang="en-US" altLang="ko-KR" b="1" dirty="0"/>
-              <a:t>– </a:t>
-            </a:r>
-            <a:r>
-              <a:rPr lang="ko-KR" altLang="en-US" sz="3100" b="1" dirty="0"/>
-              <a:t>최영민</a:t>
-            </a:r>
-            <a:r>
-              <a:rPr lang="en-US" altLang="ko-KR" b="1" dirty="0"/>
-              <a:t/>
-            </a:r>
-            <a:br>
-              <a:rPr lang="en-US" altLang="ko-KR" b="1" dirty="0"/>
-            </a:br>
-            <a:endParaRPr lang="ko-KR" altLang="en-US" dirty="0"/>
-          </a:p>
-        </p:txBody>
-      </p:sp>
-      <p:sp>
-        <p:nvSpPr>
-          <p:cNvPr id="3" name="내용 개체 틀 2"/>
-          <p:cNvSpPr>
-            <a:spLocks noGrp="1"/>
-          </p:cNvSpPr>
-          <p:nvPr>
-            <p:ph idx="1"/>
-          </p:nvPr>
-        </p:nvSpPr>
-        <p:spPr>
-          <a:xfrm>
-            <a:off x="838200" y="1825624"/>
-            <a:ext cx="10366829" cy="4865462"/>
-          </a:xfrm>
-        </p:spPr>
-        <p:txBody>
-          <a:bodyPr>
-            <a:normAutofit/>
-          </a:bodyPr>
-          <a:lstStyle/>
-          <a:p>
-            <a:r>
-              <a:rPr lang="ko-KR" altLang="en-US" b="1" dirty="0"/>
-              <a:t>개별 시스템 문서 작성 미흡</a:t>
-            </a:r>
-            <a:endParaRPr lang="en-US" altLang="ko-KR" b="1" dirty="0"/>
-          </a:p>
-          <a:p>
-            <a:r>
-              <a:rPr lang="en-US" altLang="ko-KR" b="1" dirty="0"/>
-              <a:t>UX/UI </a:t>
-            </a:r>
-            <a:r>
-              <a:rPr lang="ko-KR" altLang="en-US" b="1" dirty="0"/>
-              <a:t>기획 미흡</a:t>
-            </a:r>
-            <a:endParaRPr lang="en-US" altLang="ko-KR" b="1" dirty="0"/>
-          </a:p>
-          <a:p>
-            <a:r>
-              <a:rPr lang="ko-KR" altLang="en-US" b="1" dirty="0" smtClean="0"/>
-              <a:t>사운드</a:t>
-            </a:r>
-            <a:r>
-              <a:rPr lang="en-US" altLang="ko-KR" b="1" dirty="0" smtClean="0"/>
-              <a:t>,</a:t>
-            </a:r>
-            <a:r>
-              <a:rPr lang="ko-KR" altLang="en-US" b="1" dirty="0" smtClean="0"/>
-              <a:t>이펙트</a:t>
-            </a:r>
-            <a:r>
-              <a:rPr lang="en-US" altLang="ko-KR" b="1" dirty="0" smtClean="0"/>
-              <a:t>,</a:t>
-            </a:r>
-            <a:r>
-              <a:rPr lang="ko-KR" altLang="en-US" b="1" dirty="0" smtClean="0"/>
-              <a:t>애니메이션에 </a:t>
-            </a:r>
-            <a:r>
-              <a:rPr lang="ko-KR" altLang="en-US" b="1" dirty="0"/>
-              <a:t>대한 기획 미흡</a:t>
-            </a:r>
-            <a:endParaRPr lang="en-US" altLang="ko-KR" b="1" dirty="0"/>
-          </a:p>
-          <a:p>
-            <a:pPr marL="0" indent="0">
-              <a:buNone/>
-            </a:pPr>
-            <a:r>
-              <a:rPr lang="en-US" altLang="ko-KR" b="1" dirty="0"/>
-              <a:t>-----------------------------------------------------</a:t>
-            </a:r>
-          </a:p>
-          <a:p>
-            <a:r>
-              <a:rPr lang="ko-KR" altLang="en-US" b="1" dirty="0"/>
-              <a:t>애니메이션의 부재</a:t>
-            </a:r>
-            <a:endParaRPr lang="en-US" altLang="ko-KR" b="1" dirty="0"/>
-          </a:p>
-          <a:p>
-            <a:r>
-              <a:rPr lang="ko-KR" altLang="en-US" b="1" dirty="0"/>
-              <a:t>그래픽 툴 사용 미흡으로 인한 낮은 퀄리티의 </a:t>
-            </a:r>
-            <a:r>
-              <a:rPr lang="en-US" altLang="ko-KR" b="1" dirty="0"/>
-              <a:t>UI </a:t>
-            </a:r>
-            <a:r>
-              <a:rPr lang="ko-KR" altLang="en-US" b="1" dirty="0"/>
-              <a:t>제작</a:t>
-            </a:r>
-            <a:endParaRPr lang="en-US" altLang="ko-KR" b="1" dirty="0"/>
-          </a:p>
-          <a:p>
-            <a:r>
-              <a:rPr lang="ko-KR" altLang="en-US" b="1" dirty="0"/>
-              <a:t>이펙트 제작 미흡</a:t>
-            </a:r>
-            <a:endParaRPr lang="en-US" altLang="ko-KR" b="1" dirty="0"/>
-          </a:p>
-          <a:p>
-            <a:endParaRPr lang="en-US" altLang="ko-KR" dirty="0"/>
-          </a:p>
-          <a:p>
-            <a:endParaRPr lang="ko-KR" altLang="en-US" dirty="0"/>
-          </a:p>
-        </p:txBody>
-      </p:sp>
-      <p:sp>
-        <p:nvSpPr>
-          <p:cNvPr id="5" name="Slide Number Placeholder 4"/>
-          <p:cNvSpPr>
-            <a:spLocks noGrp="1"/>
-          </p:cNvSpPr>
-          <p:nvPr>
-            <p:ph type="sldNum" sz="quarter" idx="12"/>
-          </p:nvPr>
-        </p:nvSpPr>
-        <p:spPr/>
-        <p:txBody>
-          <a:bodyPr/>
-          <a:lstStyle/>
-          <a:p>
-            <a:fld id="{FBFC020C-1606-4BED-91BA-A6230104B3B1}" type="slidenum">
-              <a:rPr lang="ko-KR" altLang="en-US" smtClean="0"/>
-              <a:t>16</a:t>
-            </a:fld>
-            <a:endParaRPr lang="ko-KR" altLang="en-US"/>
-          </a:p>
-        </p:txBody>
-      </p:sp>
-    </p:spTree>
-    <p:extLst>
-      <p:ext uri="{BB962C8B-B14F-4D97-AF65-F5344CB8AC3E}">
-        <p14:creationId xmlns:p14="http://schemas.microsoft.com/office/powerpoint/2010/main" val="980689935"/>
-      </p:ext>
-    </p:extLst>
-  </p:cSld>
-  <p:clrMapOvr>
-    <a:masterClrMapping/>
-  </p:clrMapOvr>
-  <p:timing>
-    <p:tnLst>
-      <p:par>
-        <p:cTn id="1" dur="indefinite" restart="never" nodeType="tmRoot"/>
-      </p:par>
-    </p:tnLst>
-  </p:timing>
-</p:sld>
-</file>
-
-<file path=ppt/slides/slide17.xml><?xml version="1.0" encoding="utf-8"?>
-<p:sld xmlns:a="http://schemas.openxmlformats.org/drawingml/2006/main" xmlns:r="http://schemas.openxmlformats.org/officeDocument/2006/relationships" xmlns:p="http://schemas.openxmlformats.org/presentationml/2006/main">
-  <p:cSld>
-    <p:spTree>
-      <p:nvGrpSpPr>
-        <p:cNvPr id="1" name=""/>
-        <p:cNvGrpSpPr/>
-        <p:nvPr/>
-      </p:nvGrpSpPr>
-      <p:grpSpPr>
-        <a:xfrm>
-          <a:off x="0" y="0"/>
-          <a:ext cx="0" cy="0"/>
-          <a:chOff x="0" y="0"/>
-          <a:chExt cx="0" cy="0"/>
-        </a:xfrm>
-      </p:grpSpPr>
-      <p:sp>
-        <p:nvSpPr>
-          <p:cNvPr id="2" name="제목 1"/>
-          <p:cNvSpPr>
-            <a:spLocks noGrp="1"/>
-          </p:cNvSpPr>
-          <p:nvPr>
-            <p:ph type="title"/>
-          </p:nvPr>
-        </p:nvSpPr>
-        <p:spPr/>
-        <p:txBody>
-          <a:bodyPr>
-            <a:normAutofit fontScale="90000"/>
-          </a:bodyPr>
-          <a:lstStyle/>
-          <a:p>
-            <a:r>
-              <a:rPr lang="en-US" altLang="ko-KR" b="1" dirty="0"/>
-              <a:t/>
-            </a:r>
-            <a:br>
-              <a:rPr lang="en-US" altLang="ko-KR" b="1" dirty="0"/>
-            </a:br>
-            <a:r>
-              <a:rPr lang="en-US" altLang="ko-KR" b="1" dirty="0"/>
-              <a:t>4-2. </a:t>
-            </a:r>
-            <a:r>
-              <a:rPr lang="ko-KR" altLang="en-US" b="1" dirty="0"/>
-              <a:t>차후 기획</a:t>
-            </a:r>
-            <a:r>
-              <a:rPr lang="en-US" altLang="ko-KR" b="1" dirty="0"/>
-              <a:t>,</a:t>
-            </a:r>
-            <a:r>
-              <a:rPr lang="ko-KR" altLang="en-US" b="1" dirty="0"/>
-              <a:t>그래픽 개발 예정</a:t>
-            </a:r>
-            <a:r>
-              <a:rPr lang="en-US" altLang="ko-KR" b="1" dirty="0"/>
-              <a:t>– </a:t>
-            </a:r>
-            <a:r>
-              <a:rPr lang="ko-KR" altLang="en-US" sz="3100" b="1" dirty="0"/>
-              <a:t>최영민</a:t>
-            </a:r>
-            <a:r>
-              <a:rPr lang="en-US" altLang="ko-KR" b="1" dirty="0"/>
-              <a:t/>
-            </a:r>
-            <a:br>
-              <a:rPr lang="en-US" altLang="ko-KR" b="1" dirty="0"/>
-            </a:br>
-            <a:endParaRPr lang="ko-KR" altLang="en-US" dirty="0"/>
-          </a:p>
-        </p:txBody>
-      </p:sp>
-      <p:sp>
-        <p:nvSpPr>
-          <p:cNvPr id="3" name="내용 개체 틀 2"/>
-          <p:cNvSpPr>
-            <a:spLocks noGrp="1"/>
-          </p:cNvSpPr>
-          <p:nvPr>
-            <p:ph idx="1"/>
-          </p:nvPr>
-        </p:nvSpPr>
-        <p:spPr>
-          <a:xfrm>
-            <a:off x="838200" y="1825624"/>
-            <a:ext cx="10366829" cy="4865462"/>
-          </a:xfrm>
-        </p:spPr>
-        <p:txBody>
-          <a:bodyPr>
-            <a:normAutofit/>
-          </a:bodyPr>
-          <a:lstStyle/>
-          <a:p>
-            <a:r>
-              <a:rPr lang="ko-KR" altLang="en-US" b="1" dirty="0"/>
-              <a:t>시스템별 개별 기획서 작성</a:t>
-            </a:r>
-            <a:endParaRPr lang="en-US" altLang="ko-KR" b="1" dirty="0"/>
-          </a:p>
-          <a:p>
-            <a:r>
-              <a:rPr lang="en-US" altLang="ko-KR" b="1" dirty="0"/>
-              <a:t>UX </a:t>
-            </a:r>
-            <a:r>
-              <a:rPr lang="ko-KR" altLang="en-US" b="1" dirty="0"/>
-              <a:t>개선을 위한 </a:t>
-            </a:r>
-            <a:r>
-              <a:rPr lang="en-US" altLang="ko-KR" b="1" dirty="0"/>
-              <a:t>UI </a:t>
-            </a:r>
-            <a:r>
-              <a:rPr lang="ko-KR" altLang="en-US" b="1" dirty="0"/>
-              <a:t>기획서 작성</a:t>
-            </a:r>
-            <a:endParaRPr lang="en-US" altLang="ko-KR" b="1" dirty="0"/>
-          </a:p>
-          <a:p>
-            <a:r>
-              <a:rPr lang="ko-KR" altLang="en-US" b="1" dirty="0" smtClean="0"/>
-              <a:t>사운드</a:t>
-            </a:r>
-            <a:r>
-              <a:rPr lang="en-US" altLang="ko-KR" b="1" dirty="0" smtClean="0"/>
-              <a:t>,</a:t>
-            </a:r>
-            <a:r>
-              <a:rPr lang="ko-KR" altLang="en-US" b="1" dirty="0" smtClean="0"/>
-              <a:t>이펙트</a:t>
-            </a:r>
-            <a:r>
-              <a:rPr lang="en-US" altLang="ko-KR" b="1" dirty="0" smtClean="0"/>
-              <a:t>,</a:t>
-            </a:r>
-            <a:r>
-              <a:rPr lang="ko-KR" altLang="en-US" b="1" dirty="0" smtClean="0"/>
-              <a:t>애니메이션 작업을 </a:t>
-            </a:r>
-            <a:r>
-              <a:rPr lang="ko-KR" altLang="en-US" b="1" dirty="0"/>
-              <a:t>위한 기획서 작성</a:t>
-            </a:r>
-            <a:endParaRPr lang="en-US" altLang="ko-KR" b="1" dirty="0"/>
-          </a:p>
-          <a:p>
-            <a:r>
-              <a:rPr lang="ko-KR" altLang="en-US" b="1" dirty="0" smtClean="0"/>
-              <a:t>레벨디자인 </a:t>
-            </a:r>
-            <a:r>
-              <a:rPr lang="en-US" altLang="ko-KR" b="1" dirty="0"/>
-              <a:t>, </a:t>
-            </a:r>
-            <a:r>
-              <a:rPr lang="ko-KR" altLang="en-US" b="1" dirty="0"/>
-              <a:t>밸런싱 작업</a:t>
-            </a:r>
-            <a:endParaRPr lang="en-US" altLang="ko-KR" b="1" dirty="0"/>
-          </a:p>
-          <a:p>
-            <a:pPr marL="0" indent="0">
-              <a:buNone/>
-            </a:pPr>
-            <a:r>
-              <a:rPr lang="en-US" altLang="ko-KR" b="1" dirty="0"/>
-              <a:t>-----------------------------------------------------</a:t>
-            </a:r>
-          </a:p>
-          <a:p>
-            <a:r>
-              <a:rPr lang="ko-KR" altLang="en-US" b="1" dirty="0"/>
-              <a:t>단순한 캐릭터의 특징을 살린 애니메이션 추가</a:t>
-            </a:r>
-            <a:endParaRPr lang="en-US" altLang="ko-KR" b="1" dirty="0"/>
-          </a:p>
-          <a:p>
-            <a:r>
-              <a:rPr lang="en-US" altLang="ko-KR" b="1" dirty="0"/>
-              <a:t>UI </a:t>
-            </a:r>
-            <a:r>
-              <a:rPr lang="ko-KR" altLang="en-US" b="1" dirty="0"/>
-              <a:t>디자인 변경</a:t>
-            </a:r>
-            <a:endParaRPr lang="en-US" altLang="ko-KR" b="1" dirty="0"/>
-          </a:p>
-          <a:p>
-            <a:r>
-              <a:rPr lang="ko-KR" altLang="en-US" b="1" dirty="0" smtClean="0"/>
-              <a:t>조경물 </a:t>
-            </a:r>
-            <a:r>
-              <a:rPr lang="ko-KR" altLang="en-US" b="1" dirty="0"/>
-              <a:t>제작</a:t>
-            </a:r>
-          </a:p>
-        </p:txBody>
-      </p:sp>
-      <p:sp>
-        <p:nvSpPr>
-          <p:cNvPr id="5" name="Slide Number Placeholder 4"/>
-          <p:cNvSpPr>
-            <a:spLocks noGrp="1"/>
-          </p:cNvSpPr>
-          <p:nvPr>
-            <p:ph type="sldNum" sz="quarter" idx="12"/>
-          </p:nvPr>
-        </p:nvSpPr>
-        <p:spPr/>
-        <p:txBody>
-          <a:bodyPr/>
-          <a:lstStyle/>
-          <a:p>
-            <a:fld id="{FBFC020C-1606-4BED-91BA-A6230104B3B1}" type="slidenum">
-              <a:rPr lang="ko-KR" altLang="en-US" smtClean="0"/>
-              <a:t>17</a:t>
-            </a:fld>
-            <a:endParaRPr lang="ko-KR" altLang="en-US"/>
-          </a:p>
-        </p:txBody>
-      </p:sp>
-    </p:spTree>
-    <p:extLst>
-      <p:ext uri="{BB962C8B-B14F-4D97-AF65-F5344CB8AC3E}">
-        <p14:creationId xmlns:p14="http://schemas.microsoft.com/office/powerpoint/2010/main" val="1406679189"/>
-      </p:ext>
-    </p:extLst>
-  </p:cSld>
-  <p:clrMapOvr>
-    <a:masterClrMapping/>
-  </p:clrMapOvr>
-  <p:timing>
-    <p:tnLst>
-      <p:par>
-        <p:cTn id="1" dur="indefinite" restart="never" nodeType="tmRoot"/>
-      </p:par>
-    </p:tnLst>
-  </p:timing>
-</p:sld>
-</file>
-
-<file path=ppt/slides/slide18.xml><?xml version="1.0" encoding="utf-8"?>
-<p:sld xmlns:a="http://schemas.openxmlformats.org/drawingml/2006/main" xmlns:r="http://schemas.openxmlformats.org/officeDocument/2006/relationships" xmlns:p="http://schemas.openxmlformats.org/presentationml/2006/main">
-  <p:cSld>
-    <p:spTree>
-      <p:nvGrpSpPr>
-        <p:cNvPr id="1" name=""/>
-        <p:cNvGrpSpPr/>
-        <p:nvPr/>
-      </p:nvGrpSpPr>
-      <p:grpSpPr>
-        <a:xfrm>
-          <a:off x="0" y="0"/>
-          <a:ext cx="0" cy="0"/>
-          <a:chOff x="0" y="0"/>
-          <a:chExt cx="0" cy="0"/>
-        </a:xfrm>
-      </p:grpSpPr>
-      <p:sp>
-        <p:nvSpPr>
-          <p:cNvPr id="2" name="제목 1"/>
-          <p:cNvSpPr>
-            <a:spLocks noGrp="1"/>
-          </p:cNvSpPr>
-          <p:nvPr>
-            <p:ph type="title"/>
-          </p:nvPr>
-        </p:nvSpPr>
-        <p:spPr/>
-        <p:txBody>
-          <a:bodyPr>
-            <a:normAutofit fontScale="90000"/>
-          </a:bodyPr>
-          <a:lstStyle/>
-          <a:p>
-            <a:r>
-              <a:rPr lang="en-US" altLang="ko-KR" b="1" dirty="0"/>
-              <a:t/>
-            </a:r>
-            <a:br>
-              <a:rPr lang="en-US" altLang="ko-KR" b="1" dirty="0"/>
-            </a:br>
-            <a:r>
-              <a:rPr lang="en-US" altLang="ko-KR" b="1" dirty="0"/>
-              <a:t>4-3. </a:t>
-            </a:r>
-            <a:r>
-              <a:rPr lang="ko-KR" altLang="en-US" b="1" dirty="0"/>
-              <a:t>서버 개발 상황 </a:t>
-            </a:r>
-            <a:r>
-              <a:rPr lang="en-US" altLang="ko-KR" b="1" dirty="0"/>
-              <a:t>– </a:t>
-            </a:r>
-            <a:r>
-              <a:rPr lang="ko-KR" altLang="en-US" sz="3100" b="1" dirty="0"/>
-              <a:t>이진수</a:t>
-            </a:r>
-            <a:r>
-              <a:rPr lang="en-US" altLang="ko-KR" sz="3100" b="1" dirty="0"/>
-              <a:t> </a:t>
-            </a:r>
-            <a:r>
-              <a:rPr lang="en-US" altLang="ko-KR" b="1" dirty="0"/>
-              <a:t/>
-            </a:r>
-            <a:br>
-              <a:rPr lang="en-US" altLang="ko-KR" b="1" dirty="0"/>
-            </a:br>
-            <a:endParaRPr lang="ko-KR" altLang="en-US" dirty="0"/>
-          </a:p>
-        </p:txBody>
-      </p:sp>
-      <p:sp>
-        <p:nvSpPr>
-          <p:cNvPr id="3" name="내용 개체 틀 2"/>
-          <p:cNvSpPr>
-            <a:spLocks noGrp="1"/>
-          </p:cNvSpPr>
-          <p:nvPr>
-            <p:ph idx="1"/>
-          </p:nvPr>
-        </p:nvSpPr>
-        <p:spPr>
-          <a:xfrm>
-            <a:off x="838200" y="1825624"/>
-            <a:ext cx="10366829" cy="4865462"/>
-          </a:xfrm>
-        </p:spPr>
-        <p:txBody>
-          <a:bodyPr>
-            <a:normAutofit/>
-          </a:bodyPr>
-          <a:lstStyle/>
-          <a:p>
-            <a:r>
-              <a:rPr lang="en-US" altLang="ko-KR" b="1" dirty="0"/>
-              <a:t>DB </a:t>
-            </a:r>
-            <a:r>
-              <a:rPr lang="ko-KR" altLang="en-US" b="1" dirty="0"/>
-              <a:t>설계 및 구현 </a:t>
-            </a:r>
-            <a:endParaRPr lang="en-US" altLang="ko-KR" b="1" dirty="0"/>
-          </a:p>
-          <a:p>
-            <a:r>
-              <a:rPr lang="ko-KR" altLang="en-US" b="1" dirty="0"/>
-              <a:t>웹서버를 통한 클라이언트와 통신</a:t>
-            </a:r>
-            <a:endParaRPr lang="en-US" altLang="ko-KR" dirty="0"/>
-          </a:p>
-        </p:txBody>
-      </p:sp>
-      <p:sp>
-        <p:nvSpPr>
-          <p:cNvPr id="5" name="Slide Number Placeholder 4"/>
-          <p:cNvSpPr>
-            <a:spLocks noGrp="1"/>
-          </p:cNvSpPr>
-          <p:nvPr>
-            <p:ph type="sldNum" sz="quarter" idx="12"/>
-          </p:nvPr>
-        </p:nvSpPr>
-        <p:spPr/>
-        <p:txBody>
-          <a:bodyPr/>
-          <a:lstStyle/>
-          <a:p>
-            <a:fld id="{FBFC020C-1606-4BED-91BA-A6230104B3B1}" type="slidenum">
-              <a:rPr lang="ko-KR" altLang="en-US" smtClean="0"/>
-              <a:t>18</a:t>
-            </a:fld>
-            <a:endParaRPr lang="ko-KR" altLang="en-US"/>
-          </a:p>
-        </p:txBody>
-      </p:sp>
-    </p:spTree>
-    <p:extLst>
-      <p:ext uri="{BB962C8B-B14F-4D97-AF65-F5344CB8AC3E}">
-        <p14:creationId xmlns:p14="http://schemas.microsoft.com/office/powerpoint/2010/main" val="3773845397"/>
-      </p:ext>
-    </p:extLst>
-  </p:cSld>
-  <p:clrMapOvr>
-    <a:masterClrMapping/>
-  </p:clrMapOvr>
-  <p:timing>
-    <p:tnLst>
-      <p:par>
-        <p:cTn id="1" dur="indefinite" restart="never" nodeType="tmRoot"/>
-      </p:par>
-    </p:tnLst>
-  </p:timing>
-</p:sld>
-</file>
-
-<file path=ppt/slides/slide19.xml><?xml version="1.0" encoding="utf-8"?>
-<p:sld xmlns:a="http://schemas.openxmlformats.org/drawingml/2006/main" xmlns:r="http://schemas.openxmlformats.org/officeDocument/2006/relationships" xmlns:p="http://schemas.openxmlformats.org/presentationml/2006/main">
-  <p:cSld>
-    <p:spTree>
-      <p:nvGrpSpPr>
-        <p:cNvPr id="1" name=""/>
-        <p:cNvGrpSpPr/>
-        <p:nvPr/>
-      </p:nvGrpSpPr>
-      <p:grpSpPr>
-        <a:xfrm>
-          <a:off x="0" y="0"/>
-          <a:ext cx="0" cy="0"/>
-          <a:chOff x="0" y="0"/>
-          <a:chExt cx="0" cy="0"/>
-        </a:xfrm>
-      </p:grpSpPr>
-      <p:sp>
-        <p:nvSpPr>
-          <p:cNvPr id="2" name="제목 1"/>
-          <p:cNvSpPr>
-            <a:spLocks noGrp="1"/>
-          </p:cNvSpPr>
-          <p:nvPr>
-            <p:ph type="title"/>
-          </p:nvPr>
-        </p:nvSpPr>
-        <p:spPr/>
-        <p:txBody>
-          <a:bodyPr>
-            <a:normAutofit fontScale="90000"/>
-          </a:bodyPr>
-          <a:lstStyle/>
-          <a:p>
-            <a:r>
-              <a:rPr lang="en-US" altLang="ko-KR" b="1" dirty="0"/>
-              <a:t/>
-            </a:r>
-            <a:br>
-              <a:rPr lang="en-US" altLang="ko-KR" b="1" dirty="0"/>
-            </a:br>
-            <a:r>
-              <a:rPr lang="en-US" altLang="ko-KR" b="1" dirty="0"/>
-              <a:t>4-3. </a:t>
-            </a:r>
-            <a:r>
-              <a:rPr lang="ko-KR" altLang="en-US" b="1" dirty="0"/>
-              <a:t>서버 개발 미흡점 </a:t>
-            </a:r>
-            <a:r>
-              <a:rPr lang="en-US" altLang="ko-KR" b="1" dirty="0"/>
-              <a:t>– </a:t>
-            </a:r>
-            <a:r>
-              <a:rPr lang="ko-KR" altLang="en-US" sz="3100" b="1" dirty="0"/>
-              <a:t>이진수</a:t>
-            </a:r>
-            <a:r>
-              <a:rPr lang="en-US" altLang="ko-KR" b="1" dirty="0"/>
-              <a:t/>
-            </a:r>
-            <a:br>
-              <a:rPr lang="en-US" altLang="ko-KR" b="1" dirty="0"/>
-            </a:br>
-            <a:endParaRPr lang="ko-KR" altLang="en-US" dirty="0"/>
-          </a:p>
-        </p:txBody>
-      </p:sp>
-      <p:sp>
-        <p:nvSpPr>
-          <p:cNvPr id="3" name="내용 개체 틀 2"/>
-          <p:cNvSpPr>
-            <a:spLocks noGrp="1"/>
-          </p:cNvSpPr>
-          <p:nvPr>
-            <p:ph idx="1"/>
-          </p:nvPr>
-        </p:nvSpPr>
-        <p:spPr>
-          <a:xfrm>
-            <a:off x="838200" y="1825624"/>
-            <a:ext cx="10366829" cy="4865462"/>
-          </a:xfrm>
-        </p:spPr>
-        <p:txBody>
-          <a:bodyPr>
-            <a:normAutofit/>
-          </a:bodyPr>
-          <a:lstStyle/>
-          <a:p>
-            <a:r>
-              <a:rPr lang="ko-KR" altLang="en-US" b="1" dirty="0"/>
-              <a:t>보안 관련 지식 미숙</a:t>
-            </a:r>
-            <a:endParaRPr lang="en-US" altLang="ko-KR" b="1" dirty="0"/>
-          </a:p>
-          <a:p>
-            <a:r>
-              <a:rPr lang="ko-KR" altLang="en-US" b="1" dirty="0"/>
-              <a:t>유저 분석 관련 </a:t>
-            </a:r>
-            <a:r>
-              <a:rPr lang="en-US" altLang="ko-KR" b="1" dirty="0"/>
-              <a:t>DB </a:t>
-            </a:r>
-            <a:r>
-              <a:rPr lang="ko-KR" altLang="en-US" b="1" dirty="0"/>
-              <a:t>설계 미흡</a:t>
-            </a:r>
-            <a:endParaRPr lang="en-US" altLang="ko-KR" b="1" dirty="0"/>
-          </a:p>
-          <a:p>
-            <a:r>
-              <a:rPr lang="ko-KR" altLang="en-US" b="1" dirty="0"/>
-              <a:t>구글 로그인 연동을 </a:t>
-            </a:r>
-            <a:r>
-              <a:rPr lang="ko-KR" altLang="en-US" b="1" dirty="0" smtClean="0"/>
-              <a:t>미구</a:t>
-            </a:r>
-            <a:r>
-              <a:rPr lang="ko-KR" altLang="en-US" b="1" dirty="0"/>
-              <a:t>현</a:t>
-            </a:r>
-            <a:endParaRPr lang="en-US" altLang="ko-KR" b="1" dirty="0"/>
-          </a:p>
-          <a:p>
-            <a:r>
-              <a:rPr lang="ko-KR" altLang="en-US" b="1" dirty="0"/>
-              <a:t>리눅스를 통한 콘솔 </a:t>
-            </a:r>
-            <a:r>
-              <a:rPr lang="en-US" altLang="ko-KR" b="1" dirty="0"/>
-              <a:t>GIT </a:t>
-            </a:r>
-            <a:r>
-              <a:rPr lang="ko-KR" altLang="en-US" b="1" dirty="0"/>
-              <a:t>사용이 미숙하여 윈도우를 사용</a:t>
-            </a:r>
-            <a:endParaRPr lang="en-US" altLang="ko-KR" b="1" dirty="0"/>
-          </a:p>
-          <a:p>
-            <a:endParaRPr lang="en-US" altLang="ko-KR" b="1" dirty="0"/>
-          </a:p>
-          <a:p>
-            <a:endParaRPr lang="en-US" altLang="ko-KR" b="1" dirty="0"/>
-          </a:p>
-          <a:p>
-            <a:endParaRPr lang="en-US" altLang="ko-KR" b="1" dirty="0"/>
-          </a:p>
-        </p:txBody>
-      </p:sp>
-      <p:sp>
-        <p:nvSpPr>
-          <p:cNvPr id="5" name="Slide Number Placeholder 4"/>
-          <p:cNvSpPr>
-            <a:spLocks noGrp="1"/>
-          </p:cNvSpPr>
-          <p:nvPr>
-            <p:ph type="sldNum" sz="quarter" idx="12"/>
-          </p:nvPr>
-        </p:nvSpPr>
-        <p:spPr/>
-        <p:txBody>
-          <a:bodyPr/>
-          <a:lstStyle/>
-          <a:p>
-            <a:fld id="{FBFC020C-1606-4BED-91BA-A6230104B3B1}" type="slidenum">
-              <a:rPr lang="ko-KR" altLang="en-US" smtClean="0"/>
-              <a:t>19</a:t>
-            </a:fld>
-            <a:endParaRPr lang="ko-KR" altLang="en-US"/>
-          </a:p>
-        </p:txBody>
-      </p:sp>
-    </p:spTree>
-    <p:extLst>
-      <p:ext uri="{BB962C8B-B14F-4D97-AF65-F5344CB8AC3E}">
-        <p14:creationId xmlns:p14="http://schemas.microsoft.com/office/powerpoint/2010/main" val="980689935"/>
-      </p:ext>
-    </p:extLst>
-  </p:cSld>
-  <p:clrMapOvr>
-    <a:masterClrMapping/>
-  </p:clrMapOvr>
-  <p:timing>
-    <p:tnLst>
-      <p:par>
-        <p:cTn id="1" dur="indefinite" restart="never" nodeType="tmRoot"/>
-      </p:par>
-    </p:tnLst>
-  </p:timing>
-</p:sld>
-</file>
-
 <file path=ppt/slides/slide2.xml><?xml version="1.0" encoding="utf-8"?>
 <p:sld xmlns:a="http://schemas.openxmlformats.org/drawingml/2006/main" xmlns:r="http://schemas.openxmlformats.org/officeDocument/2006/relationships" xmlns:p="http://schemas.openxmlformats.org/presentationml/2006/main">
   <p:cSld>
@@ -7291,654 +6214,6 @@
     <p:extLst>
       <p:ext uri="{BB962C8B-B14F-4D97-AF65-F5344CB8AC3E}">
         <p14:creationId xmlns:p14="http://schemas.microsoft.com/office/powerpoint/2010/main" val="1506790528"/>
-      </p:ext>
-    </p:extLst>
-  </p:cSld>
-  <p:clrMapOvr>
-    <a:masterClrMapping/>
-  </p:clrMapOvr>
-  <p:timing>
-    <p:tnLst>
-      <p:par>
-        <p:cTn id="1" dur="indefinite" restart="never" nodeType="tmRoot"/>
-      </p:par>
-    </p:tnLst>
-  </p:timing>
-</p:sld>
-</file>
-
-<file path=ppt/slides/slide20.xml><?xml version="1.0" encoding="utf-8"?>
-<p:sld xmlns:a="http://schemas.openxmlformats.org/drawingml/2006/main" xmlns:r="http://schemas.openxmlformats.org/officeDocument/2006/relationships" xmlns:p="http://schemas.openxmlformats.org/presentationml/2006/main">
-  <p:cSld>
-    <p:spTree>
-      <p:nvGrpSpPr>
-        <p:cNvPr id="1" name=""/>
-        <p:cNvGrpSpPr/>
-        <p:nvPr/>
-      </p:nvGrpSpPr>
-      <p:grpSpPr>
-        <a:xfrm>
-          <a:off x="0" y="0"/>
-          <a:ext cx="0" cy="0"/>
-          <a:chOff x="0" y="0"/>
-          <a:chExt cx="0" cy="0"/>
-        </a:xfrm>
-      </p:grpSpPr>
-      <p:sp>
-        <p:nvSpPr>
-          <p:cNvPr id="2" name="제목 1"/>
-          <p:cNvSpPr>
-            <a:spLocks noGrp="1"/>
-          </p:cNvSpPr>
-          <p:nvPr>
-            <p:ph type="title"/>
-          </p:nvPr>
-        </p:nvSpPr>
-        <p:spPr/>
-        <p:txBody>
-          <a:bodyPr>
-            <a:normAutofit fontScale="90000"/>
-          </a:bodyPr>
-          <a:lstStyle/>
-          <a:p>
-            <a:r>
-              <a:rPr lang="en-US" altLang="ko-KR" b="1" dirty="0"/>
-              <a:t/>
-            </a:r>
-            <a:br>
-              <a:rPr lang="en-US" altLang="ko-KR" b="1" dirty="0"/>
-            </a:br>
-            <a:r>
-              <a:rPr lang="en-US" altLang="ko-KR" b="1" dirty="0"/>
-              <a:t>4-3. </a:t>
-            </a:r>
-            <a:r>
-              <a:rPr lang="ko-KR" altLang="en-US" b="1" dirty="0"/>
-              <a:t>차후 서버 개발 예정 </a:t>
-            </a:r>
-            <a:r>
-              <a:rPr lang="en-US" altLang="ko-KR" b="1" dirty="0"/>
-              <a:t>– </a:t>
-            </a:r>
-            <a:r>
-              <a:rPr lang="ko-KR" altLang="en-US" sz="3100" b="1" dirty="0"/>
-              <a:t>이진수</a:t>
-            </a:r>
-            <a:r>
-              <a:rPr lang="en-US" altLang="ko-KR" b="1" dirty="0"/>
-              <a:t/>
-            </a:r>
-            <a:br>
-              <a:rPr lang="en-US" altLang="ko-KR" b="1" dirty="0"/>
-            </a:br>
-            <a:endParaRPr lang="ko-KR" altLang="en-US" dirty="0"/>
-          </a:p>
-        </p:txBody>
-      </p:sp>
-      <p:sp>
-        <p:nvSpPr>
-          <p:cNvPr id="3" name="내용 개체 틀 2"/>
-          <p:cNvSpPr>
-            <a:spLocks noGrp="1"/>
-          </p:cNvSpPr>
-          <p:nvPr>
-            <p:ph idx="1"/>
-          </p:nvPr>
-        </p:nvSpPr>
-        <p:spPr>
-          <a:xfrm>
-            <a:off x="838200" y="1825624"/>
-            <a:ext cx="10366829" cy="4865462"/>
-          </a:xfrm>
-        </p:spPr>
-        <p:txBody>
-          <a:bodyPr>
-            <a:normAutofit/>
-          </a:bodyPr>
-          <a:lstStyle/>
-          <a:p>
-            <a:r>
-              <a:rPr lang="ko-KR" altLang="en-US" b="1" dirty="0"/>
-              <a:t>대전 시스템에 따른 </a:t>
-            </a:r>
-            <a:r>
-              <a:rPr lang="en-US" altLang="ko-KR" b="1" dirty="0"/>
-              <a:t>DB </a:t>
-            </a:r>
-            <a:r>
-              <a:rPr lang="ko-KR" altLang="en-US" b="1" dirty="0"/>
-              <a:t>수정</a:t>
-            </a:r>
-            <a:endParaRPr lang="en-US" altLang="ko-KR" b="1" dirty="0"/>
-          </a:p>
-          <a:p>
-            <a:r>
-              <a:rPr lang="ko-KR" altLang="en-US" b="1" dirty="0"/>
-              <a:t>유저 분석 </a:t>
-            </a:r>
-            <a:r>
-              <a:rPr lang="en-US" altLang="ko-KR" b="1" dirty="0"/>
-              <a:t>DB </a:t>
-            </a:r>
-            <a:r>
-              <a:rPr lang="ko-KR" altLang="en-US" b="1" dirty="0"/>
-              <a:t>제작</a:t>
-            </a:r>
-            <a:endParaRPr lang="en-US" altLang="ko-KR" dirty="0"/>
-          </a:p>
-          <a:p>
-            <a:r>
-              <a:rPr lang="ko-KR" altLang="en-US" b="1" dirty="0"/>
-              <a:t>서버 보안 예정</a:t>
-            </a:r>
-            <a:endParaRPr lang="en-US" altLang="ko-KR" b="1" dirty="0"/>
-          </a:p>
-          <a:p>
-            <a:r>
-              <a:rPr lang="ko-KR" altLang="en-US" b="1" dirty="0"/>
-              <a:t> 서버 데이터 </a:t>
-            </a:r>
-            <a:r>
-              <a:rPr lang="en-US" altLang="ko-KR" b="1" dirty="0"/>
-              <a:t>IBM </a:t>
-            </a:r>
-            <a:r>
-              <a:rPr lang="ko-KR" altLang="en-US" b="1" dirty="0"/>
-              <a:t>클라우드에 적용 </a:t>
-            </a:r>
-            <a:endParaRPr lang="en-US" altLang="ko-KR" b="1" dirty="0"/>
-          </a:p>
-        </p:txBody>
-      </p:sp>
-      <p:sp>
-        <p:nvSpPr>
-          <p:cNvPr id="5" name="Slide Number Placeholder 4"/>
-          <p:cNvSpPr>
-            <a:spLocks noGrp="1"/>
-          </p:cNvSpPr>
-          <p:nvPr>
-            <p:ph type="sldNum" sz="quarter" idx="12"/>
-          </p:nvPr>
-        </p:nvSpPr>
-        <p:spPr/>
-        <p:txBody>
-          <a:bodyPr/>
-          <a:lstStyle/>
-          <a:p>
-            <a:fld id="{FBFC020C-1606-4BED-91BA-A6230104B3B1}" type="slidenum">
-              <a:rPr lang="ko-KR" altLang="en-US" smtClean="0"/>
-              <a:t>20</a:t>
-            </a:fld>
-            <a:endParaRPr lang="ko-KR" altLang="en-US"/>
-          </a:p>
-        </p:txBody>
-      </p:sp>
-    </p:spTree>
-    <p:extLst>
-      <p:ext uri="{BB962C8B-B14F-4D97-AF65-F5344CB8AC3E}">
-        <p14:creationId xmlns:p14="http://schemas.microsoft.com/office/powerpoint/2010/main" val="1406679189"/>
-      </p:ext>
-    </p:extLst>
-  </p:cSld>
-  <p:clrMapOvr>
-    <a:masterClrMapping/>
-  </p:clrMapOvr>
-  <p:timing>
-    <p:tnLst>
-      <p:par>
-        <p:cTn id="1" dur="indefinite" restart="never" nodeType="tmRoot"/>
-      </p:par>
-    </p:tnLst>
-  </p:timing>
-</p:sld>
-</file>
-
-<file path=ppt/slides/slide21.xml><?xml version="1.0" encoding="utf-8"?>
-<p:sld xmlns:a="http://schemas.openxmlformats.org/drawingml/2006/main" xmlns:r="http://schemas.openxmlformats.org/officeDocument/2006/relationships" xmlns:p="http://schemas.openxmlformats.org/presentationml/2006/main">
-  <p:cSld>
-    <p:spTree>
-      <p:nvGrpSpPr>
-        <p:cNvPr id="1" name=""/>
-        <p:cNvGrpSpPr/>
-        <p:nvPr/>
-      </p:nvGrpSpPr>
-      <p:grpSpPr>
-        <a:xfrm>
-          <a:off x="0" y="0"/>
-          <a:ext cx="0" cy="0"/>
-          <a:chOff x="0" y="0"/>
-          <a:chExt cx="0" cy="0"/>
-        </a:xfrm>
-      </p:grpSpPr>
-      <p:sp>
-        <p:nvSpPr>
-          <p:cNvPr id="2" name="제목 1"/>
-          <p:cNvSpPr>
-            <a:spLocks noGrp="1"/>
-          </p:cNvSpPr>
-          <p:nvPr>
-            <p:ph type="title"/>
-          </p:nvPr>
-        </p:nvSpPr>
-        <p:spPr/>
-        <p:txBody>
-          <a:bodyPr/>
-          <a:lstStyle/>
-          <a:p>
-            <a:r>
-              <a:rPr lang="en-US" altLang="ko-KR" b="1" dirty="0"/>
-              <a:t>3. </a:t>
-            </a:r>
-            <a:r>
-              <a:rPr lang="ko-KR" altLang="en-US" b="1" dirty="0" err="1"/>
-              <a:t>게임조작</a:t>
-            </a:r>
-            <a:endParaRPr lang="ko-KR" altLang="en-US" b="1" dirty="0"/>
-          </a:p>
-        </p:txBody>
-      </p:sp>
-      <p:grpSp>
-        <p:nvGrpSpPr>
-          <p:cNvPr id="7" name="Group 6"/>
-          <p:cNvGrpSpPr/>
-          <p:nvPr/>
-        </p:nvGrpSpPr>
-        <p:grpSpPr>
-          <a:xfrm>
-            <a:off x="502028" y="2060840"/>
-            <a:ext cx="5129025" cy="2736315"/>
-            <a:chOff x="-2" y="2060842"/>
-            <a:chExt cx="5129025" cy="2736315"/>
-          </a:xfrm>
-        </p:grpSpPr>
-        <p:pic>
-          <p:nvPicPr>
-            <p:cNvPr id="6" name="Picture 5"/>
-            <p:cNvPicPr>
-              <a:picLocks noChangeAspect="1"/>
-            </p:cNvPicPr>
-            <p:nvPr/>
-          </p:nvPicPr>
-          <p:blipFill>
-            <a:blip r:embed="rId2" cstate="print">
-              <a:extLst>
-                <a:ext uri="{28A0092B-C50C-407E-A947-70E740481C1C}">
-                  <a14:useLocalDpi xmlns:a14="http://schemas.microsoft.com/office/drawing/2010/main" val="0"/>
-                </a:ext>
-              </a:extLst>
-            </a:blip>
-            <a:stretch>
-              <a:fillRect/>
-            </a:stretch>
-          </p:blipFill>
-          <p:spPr>
-            <a:xfrm>
-              <a:off x="502028" y="2268853"/>
-              <a:ext cx="4124964" cy="2320292"/>
-            </a:xfrm>
-            <a:prstGeom prst="rect">
-              <a:avLst/>
-            </a:prstGeom>
-          </p:spPr>
-        </p:pic>
-        <p:pic>
-          <p:nvPicPr>
-            <p:cNvPr id="5" name="Picture 4"/>
-            <p:cNvPicPr>
-              <a:picLocks noChangeAspect="1"/>
-            </p:cNvPicPr>
-            <p:nvPr/>
-          </p:nvPicPr>
-          <p:blipFill>
-            <a:blip r:embed="rId3">
-              <a:extLst>
-                <a:ext uri="{28A0092B-C50C-407E-A947-70E740481C1C}">
-                  <a14:useLocalDpi xmlns:a14="http://schemas.microsoft.com/office/drawing/2010/main" val="0"/>
-                </a:ext>
-              </a:extLst>
-            </a:blip>
-            <a:stretch>
-              <a:fillRect/>
-            </a:stretch>
-          </p:blipFill>
-          <p:spPr>
-            <a:xfrm>
-              <a:off x="-2" y="2060842"/>
-              <a:ext cx="5129025" cy="2736315"/>
-            </a:xfrm>
-            <a:prstGeom prst="rect">
-              <a:avLst/>
-            </a:prstGeom>
-          </p:spPr>
-        </p:pic>
-      </p:grpSp>
-      <p:pic>
-        <p:nvPicPr>
-          <p:cNvPr id="8" name="Picture 7"/>
-          <p:cNvPicPr>
-            <a:picLocks noChangeAspect="1"/>
-          </p:cNvPicPr>
-          <p:nvPr/>
-        </p:nvPicPr>
-        <p:blipFill>
-          <a:blip r:embed="rId4">
-            <a:extLst>
-              <a:ext uri="{28A0092B-C50C-407E-A947-70E740481C1C}">
-                <a14:useLocalDpi xmlns:a14="http://schemas.microsoft.com/office/drawing/2010/main" val="0"/>
-              </a:ext>
-            </a:extLst>
-          </a:blip>
-          <a:stretch>
-            <a:fillRect/>
-          </a:stretch>
-        </p:blipFill>
-        <p:spPr>
-          <a:xfrm>
-            <a:off x="1944916" y="4212771"/>
-            <a:ext cx="1404258" cy="1404258"/>
-          </a:xfrm>
-          <a:prstGeom prst="rect">
-            <a:avLst/>
-          </a:prstGeom>
-        </p:spPr>
-      </p:pic>
-      <p:sp>
-        <p:nvSpPr>
-          <p:cNvPr id="9" name="TextBox 8"/>
-          <p:cNvSpPr txBox="1"/>
-          <p:nvPr/>
-        </p:nvSpPr>
-        <p:spPr>
-          <a:xfrm>
-            <a:off x="729740" y="5776683"/>
-            <a:ext cx="4673600" cy="646331"/>
-          </a:xfrm>
-          <a:prstGeom prst="rect">
-            <a:avLst/>
-          </a:prstGeom>
-          <a:noFill/>
-        </p:spPr>
-        <p:txBody>
-          <a:bodyPr wrap="square" rtlCol="0">
-            <a:spAutoFit/>
-          </a:bodyPr>
-          <a:lstStyle/>
-          <a:p>
-            <a:pPr algn="ctr"/>
-            <a:r>
-              <a:rPr lang="ko-KR" altLang="en-US" dirty="0"/>
-              <a:t>화면 탭하기 </a:t>
-            </a:r>
-            <a:endParaRPr lang="en-US" altLang="ko-KR" dirty="0"/>
-          </a:p>
-          <a:p>
-            <a:pPr marL="285750" indent="-285750" algn="ctr">
-              <a:buFontTx/>
-              <a:buChar char="-"/>
-            </a:pPr>
-            <a:r>
-              <a:rPr lang="ko-KR" altLang="en-US" dirty="0"/>
-              <a:t>선택</a:t>
-            </a:r>
-            <a:r>
-              <a:rPr lang="en-US" altLang="ko-KR" dirty="0"/>
-              <a:t>, </a:t>
-            </a:r>
-            <a:r>
-              <a:rPr lang="ko-KR" altLang="en-US" dirty="0"/>
-              <a:t>지정</a:t>
-            </a:r>
-          </a:p>
-        </p:txBody>
-      </p:sp>
-      <p:grpSp>
-        <p:nvGrpSpPr>
-          <p:cNvPr id="10" name="Group 9"/>
-          <p:cNvGrpSpPr/>
-          <p:nvPr/>
-        </p:nvGrpSpPr>
-        <p:grpSpPr>
-          <a:xfrm>
-            <a:off x="6770913" y="2060841"/>
-            <a:ext cx="5129025" cy="2736315"/>
-            <a:chOff x="-2" y="2060842"/>
-            <a:chExt cx="5129025" cy="2736315"/>
-          </a:xfrm>
-        </p:grpSpPr>
-        <p:pic>
-          <p:nvPicPr>
-            <p:cNvPr id="11" name="Picture 10"/>
-            <p:cNvPicPr>
-              <a:picLocks noChangeAspect="1"/>
-            </p:cNvPicPr>
-            <p:nvPr/>
-          </p:nvPicPr>
-          <p:blipFill>
-            <a:blip r:embed="rId2" cstate="print">
-              <a:extLst>
-                <a:ext uri="{28A0092B-C50C-407E-A947-70E740481C1C}">
-                  <a14:useLocalDpi xmlns:a14="http://schemas.microsoft.com/office/drawing/2010/main" val="0"/>
-                </a:ext>
-              </a:extLst>
-            </a:blip>
-            <a:stretch>
-              <a:fillRect/>
-            </a:stretch>
-          </p:blipFill>
-          <p:spPr>
-            <a:xfrm>
-              <a:off x="502028" y="2268853"/>
-              <a:ext cx="4124964" cy="2320292"/>
-            </a:xfrm>
-            <a:prstGeom prst="rect">
-              <a:avLst/>
-            </a:prstGeom>
-          </p:spPr>
-        </p:pic>
-        <p:pic>
-          <p:nvPicPr>
-            <p:cNvPr id="12" name="Picture 11"/>
-            <p:cNvPicPr>
-              <a:picLocks noChangeAspect="1"/>
-            </p:cNvPicPr>
-            <p:nvPr/>
-          </p:nvPicPr>
-          <p:blipFill>
-            <a:blip r:embed="rId3">
-              <a:extLst>
-                <a:ext uri="{28A0092B-C50C-407E-A947-70E740481C1C}">
-                  <a14:useLocalDpi xmlns:a14="http://schemas.microsoft.com/office/drawing/2010/main" val="0"/>
-                </a:ext>
-              </a:extLst>
-            </a:blip>
-            <a:stretch>
-              <a:fillRect/>
-            </a:stretch>
-          </p:blipFill>
-          <p:spPr>
-            <a:xfrm>
-              <a:off x="-2" y="2060842"/>
-              <a:ext cx="5129025" cy="2736315"/>
-            </a:xfrm>
-            <a:prstGeom prst="rect">
-              <a:avLst/>
-            </a:prstGeom>
-          </p:spPr>
-        </p:pic>
-      </p:grpSp>
-      <p:pic>
-        <p:nvPicPr>
-          <p:cNvPr id="14" name="Picture 13"/>
-          <p:cNvPicPr>
-            <a:picLocks noChangeAspect="1"/>
-          </p:cNvPicPr>
-          <p:nvPr/>
-        </p:nvPicPr>
-        <p:blipFill>
-          <a:blip r:embed="rId4">
-            <a:extLst>
-              <a:ext uri="{28A0092B-C50C-407E-A947-70E740481C1C}">
-                <a14:useLocalDpi xmlns:a14="http://schemas.microsoft.com/office/drawing/2010/main" val="0"/>
-              </a:ext>
-            </a:extLst>
-          </a:blip>
-          <a:stretch>
-            <a:fillRect/>
-          </a:stretch>
-        </p:blipFill>
-        <p:spPr>
-          <a:xfrm>
-            <a:off x="7511145" y="3663042"/>
-            <a:ext cx="1404258" cy="1404258"/>
-          </a:xfrm>
-          <a:prstGeom prst="rect">
-            <a:avLst/>
-          </a:prstGeom>
-        </p:spPr>
-      </p:pic>
-      <p:pic>
-        <p:nvPicPr>
-          <p:cNvPr id="15" name="Picture 14"/>
-          <p:cNvPicPr>
-            <a:picLocks noChangeAspect="1"/>
-          </p:cNvPicPr>
-          <p:nvPr/>
-        </p:nvPicPr>
-        <p:blipFill>
-          <a:blip r:embed="rId4">
-            <a:extLst>
-              <a:ext uri="{28A0092B-C50C-407E-A947-70E740481C1C}">
-                <a14:useLocalDpi xmlns:a14="http://schemas.microsoft.com/office/drawing/2010/main" val="0"/>
-              </a:ext>
-            </a:extLst>
-          </a:blip>
-          <a:stretch>
-            <a:fillRect/>
-          </a:stretch>
-        </p:blipFill>
-        <p:spPr>
-          <a:xfrm>
-            <a:off x="9652002" y="2841170"/>
-            <a:ext cx="1404258" cy="1404258"/>
-          </a:xfrm>
-          <a:prstGeom prst="rect">
-            <a:avLst/>
-          </a:prstGeom>
-        </p:spPr>
-      </p:pic>
-      <p:sp>
-        <p:nvSpPr>
-          <p:cNvPr id="16" name="Striped Right Arrow 15"/>
-          <p:cNvSpPr/>
-          <p:nvPr/>
-        </p:nvSpPr>
-        <p:spPr>
-          <a:xfrm rot="20244813">
-            <a:off x="8427290" y="3120396"/>
-            <a:ext cx="1525986" cy="617207"/>
-          </a:xfrm>
-          <a:prstGeom prst="stripedRightArrow">
-            <a:avLst>
-              <a:gd name="adj1" fmla="val 49448"/>
-              <a:gd name="adj2" fmla="val 50000"/>
-            </a:avLst>
-          </a:prstGeom>
-        </p:spPr>
-        <p:style>
-          <a:lnRef idx="2">
-            <a:schemeClr val="dk1"/>
-          </a:lnRef>
-          <a:fillRef idx="1">
-            <a:schemeClr val="lt1"/>
-          </a:fillRef>
-          <a:effectRef idx="0">
-            <a:schemeClr val="dk1"/>
-          </a:effectRef>
-          <a:fontRef idx="minor">
-            <a:schemeClr val="dk1"/>
-          </a:fontRef>
-        </p:style>
-        <p:txBody>
-          <a:bodyPr rtlCol="0" anchor="ctr"/>
-          <a:lstStyle/>
-          <a:p>
-            <a:pPr algn="ctr"/>
-            <a:endParaRPr lang="ko-KR" altLang="en-US" dirty="0"/>
-          </a:p>
-        </p:txBody>
-      </p:sp>
-      <p:sp>
-        <p:nvSpPr>
-          <p:cNvPr id="17" name="TextBox 16"/>
-          <p:cNvSpPr txBox="1"/>
-          <p:nvPr/>
-        </p:nvSpPr>
-        <p:spPr>
-          <a:xfrm>
-            <a:off x="6998625" y="5798454"/>
-            <a:ext cx="4673600" cy="646331"/>
-          </a:xfrm>
-          <a:prstGeom prst="rect">
-            <a:avLst/>
-          </a:prstGeom>
-          <a:noFill/>
-        </p:spPr>
-        <p:txBody>
-          <a:bodyPr wrap="square" rtlCol="0">
-            <a:spAutoFit/>
-          </a:bodyPr>
-          <a:lstStyle/>
-          <a:p>
-            <a:pPr algn="ctr"/>
-            <a:r>
-              <a:rPr lang="ko-KR" altLang="en-US" dirty="0"/>
-              <a:t>화면 드래그</a:t>
-            </a:r>
-            <a:r>
-              <a:rPr lang="en-US" altLang="ko-KR" dirty="0"/>
-              <a:t/>
-            </a:r>
-            <a:br>
-              <a:rPr lang="en-US" altLang="ko-KR" dirty="0"/>
-            </a:br>
-            <a:r>
-              <a:rPr lang="en-US" altLang="ko-KR" dirty="0"/>
-              <a:t>- </a:t>
-            </a:r>
-            <a:r>
-              <a:rPr lang="ko-KR" altLang="en-US" dirty="0"/>
-              <a:t>카메라 이동</a:t>
-            </a:r>
-          </a:p>
-        </p:txBody>
-      </p:sp>
-      <p:sp>
-        <p:nvSpPr>
-          <p:cNvPr id="4" name="Slide Number Placeholder 3"/>
-          <p:cNvSpPr>
-            <a:spLocks noGrp="1"/>
-          </p:cNvSpPr>
-          <p:nvPr>
-            <p:ph type="sldNum" sz="quarter" idx="12"/>
-          </p:nvPr>
-        </p:nvSpPr>
-        <p:spPr/>
-        <p:txBody>
-          <a:bodyPr/>
-          <a:lstStyle/>
-          <a:p>
-            <a:fld id="{FBFC020C-1606-4BED-91BA-A6230104B3B1}" type="slidenum">
-              <a:rPr lang="ko-KR" altLang="en-US" smtClean="0"/>
-              <a:t>21</a:t>
-            </a:fld>
-            <a:endParaRPr lang="ko-KR" altLang="en-US"/>
-          </a:p>
-        </p:txBody>
-      </p:sp>
-    </p:spTree>
-    <p:extLst>
-      <p:ext uri="{BB962C8B-B14F-4D97-AF65-F5344CB8AC3E}">
-        <p14:creationId xmlns:p14="http://schemas.microsoft.com/office/powerpoint/2010/main" val="751557718"/>
       </p:ext>
     </p:extLst>
   </p:cSld>
@@ -8136,9 +6411,7 @@
               <a:gd name="adj" fmla="val 37214"/>
             </a:avLst>
           </a:prstGeom>
-          <a:ln>
-            <a:noFill/>
-          </a:ln>
+          <a:ln/>
         </p:spPr>
         <p:style>
           <a:lnRef idx="2">
@@ -8174,7 +6447,7 @@
         <p:spPr>
           <a:xfrm>
             <a:off x="1077686" y="4284937"/>
-            <a:ext cx="3804557" cy="1323439"/>
+            <a:ext cx="3804557" cy="1384995"/>
           </a:xfrm>
           <a:prstGeom prst="rect">
             <a:avLst/>
@@ -8188,7 +6461,7 @@
           <a:lstStyle/>
           <a:p>
             <a:r>
-              <a:rPr lang="en-US" altLang="ko-KR" sz="2000" dirty="0"/>
+              <a:rPr lang="en-US" altLang="ko-KR" sz="2400" b="1" dirty="0"/>
               <a:t>SRPG</a:t>
             </a:r>
           </a:p>
@@ -8235,7 +6508,7 @@
         <p:spPr>
           <a:xfrm>
             <a:off x="7467600" y="4284937"/>
-            <a:ext cx="3804557" cy="1631216"/>
+            <a:ext cx="3804557" cy="1692771"/>
           </a:xfrm>
           <a:prstGeom prst="rect">
             <a:avLst/>
@@ -8249,7 +6522,7 @@
           <a:lstStyle/>
           <a:p>
             <a:r>
-              <a:rPr lang="en-US" altLang="ko-KR" sz="2000" dirty="0"/>
+              <a:rPr lang="en-US" altLang="ko-KR" sz="2400" b="1" dirty="0"/>
               <a:t>TCG</a:t>
             </a:r>
           </a:p>
@@ -9120,9 +7393,14 @@
           <a:p>
             <a:pPr algn="ctr"/>
             <a:r>
+              <a:rPr lang="ko-KR" altLang="en-US" sz="1400" dirty="0" smtClean="0"/>
+              <a:t>클리</a:t>
+            </a:r>
+            <a:r>
               <a:rPr lang="ko-KR" altLang="en-US" sz="1400" dirty="0"/>
-              <a:t>진행</a:t>
-            </a:r>
+              <a:t>어</a:t>
+            </a:r>
+            <a:endParaRPr lang="ko-KR" altLang="en-US" sz="1400" dirty="0"/>
           </a:p>
         </p:txBody>
       </p:sp>
@@ -13002,7 +11280,7 @@
   <a:extraClrSchemeLst/>
   <a:extLst>
     <a:ext uri="{05A4C25C-085E-4340-85A3-A5531E510DB2}">
-      <thm15:themeFamily xmlns="" xmlns:thm15="http://schemas.microsoft.com/office/thememl/2012/main" name="Office Theme" id="{62F939B6-93AF-4DB8-9C6B-D6C7DFDC589F}" vid="{4A3C46E8-61CC-4603-A589-7422A47A8E4A}"/>
+      <thm15:themeFamily xmlns:thm15="http://schemas.microsoft.com/office/thememl/2012/main" xmlns="" name="Office Theme" id="{62F939B6-93AF-4DB8-9C6B-D6C7DFDC589F}" vid="{4A3C46E8-61CC-4603-A589-7422A47A8E4A}"/>
     </a:ext>
   </a:extLst>
 </a:theme>

</xml_diff>